<commit_message>
Adds chapter6-fort-roof explanations and images
</commit_message>
<xml_diff>
--- a/assets/chapter-6-images/chapter-6-images.pptx
+++ b/assets/chapter-6-images/chapter-6-images.pptx
@@ -6,7 +6,12 @@
   </p:sldMasterIdLst>
   <p:sldIdLst>
     <p:sldId id="257" r:id="rId2"/>
-    <p:sldId id="258" r:id="rId3"/>
+    <p:sldId id="260" r:id="rId3"/>
+    <p:sldId id="258" r:id="rId4"/>
+    <p:sldId id="259" r:id="rId5"/>
+    <p:sldId id="261" r:id="rId6"/>
+    <p:sldId id="262" r:id="rId7"/>
+    <p:sldId id="263" r:id="rId8"/>
   </p:sldIdLst>
   <p:sldSz cx="12192000" cy="6858000"/>
   <p:notesSz cx="6858000" cy="9144000"/>
@@ -105,6 +110,11 @@
       </a:defRPr>
     </a:lvl9pPr>
   </p:defaultTextStyle>
+  <p:extLst>
+    <p:ext uri="{EFAFB233-063F-42B5-8137-9DF3F51BA10A}">
+      <p15:sldGuideLst xmlns:p15="http://schemas.microsoft.com/office/powerpoint/2012/main"/>
+    </p:ext>
+  </p:extLst>
 </p:presentation>
 </file>
 
@@ -239,7 +249,7 @@
           <a:p>
             <a:fld id="{1C173AAD-17BE-4B70-87A9-E7BA74A6C5B5}" type="datetimeFigureOut">
               <a:rPr lang="bg-BG" smtClean="0"/>
-              <a:t>7.3.2017 г.</a:t>
+              <a:t>8.3.2017 г.</a:t>
             </a:fld>
             <a:endParaRPr lang="bg-BG"/>
           </a:p>
@@ -409,7 +419,7 @@
           <a:p>
             <a:fld id="{1C173AAD-17BE-4B70-87A9-E7BA74A6C5B5}" type="datetimeFigureOut">
               <a:rPr lang="bg-BG" smtClean="0"/>
-              <a:t>7.3.2017 г.</a:t>
+              <a:t>8.3.2017 г.</a:t>
             </a:fld>
             <a:endParaRPr lang="bg-BG"/>
           </a:p>
@@ -589,7 +599,7 @@
           <a:p>
             <a:fld id="{1C173AAD-17BE-4B70-87A9-E7BA74A6C5B5}" type="datetimeFigureOut">
               <a:rPr lang="bg-BG" smtClean="0"/>
-              <a:t>7.3.2017 г.</a:t>
+              <a:t>8.3.2017 г.</a:t>
             </a:fld>
             <a:endParaRPr lang="bg-BG"/>
           </a:p>
@@ -759,7 +769,7 @@
           <a:p>
             <a:fld id="{1C173AAD-17BE-4B70-87A9-E7BA74A6C5B5}" type="datetimeFigureOut">
               <a:rPr lang="bg-BG" smtClean="0"/>
-              <a:t>7.3.2017 г.</a:t>
+              <a:t>8.3.2017 г.</a:t>
             </a:fld>
             <a:endParaRPr lang="bg-BG"/>
           </a:p>
@@ -1005,7 +1015,7 @@
           <a:p>
             <a:fld id="{1C173AAD-17BE-4B70-87A9-E7BA74A6C5B5}" type="datetimeFigureOut">
               <a:rPr lang="bg-BG" smtClean="0"/>
-              <a:t>7.3.2017 г.</a:t>
+              <a:t>8.3.2017 г.</a:t>
             </a:fld>
             <a:endParaRPr lang="bg-BG"/>
           </a:p>
@@ -1237,7 +1247,7 @@
           <a:p>
             <a:fld id="{1C173AAD-17BE-4B70-87A9-E7BA74A6C5B5}" type="datetimeFigureOut">
               <a:rPr lang="bg-BG" smtClean="0"/>
-              <a:t>7.3.2017 г.</a:t>
+              <a:t>8.3.2017 г.</a:t>
             </a:fld>
             <a:endParaRPr lang="bg-BG"/>
           </a:p>
@@ -1604,7 +1614,7 @@
           <a:p>
             <a:fld id="{1C173AAD-17BE-4B70-87A9-E7BA74A6C5B5}" type="datetimeFigureOut">
               <a:rPr lang="bg-BG" smtClean="0"/>
-              <a:t>7.3.2017 г.</a:t>
+              <a:t>8.3.2017 г.</a:t>
             </a:fld>
             <a:endParaRPr lang="bg-BG"/>
           </a:p>
@@ -1722,7 +1732,7 @@
           <a:p>
             <a:fld id="{1C173AAD-17BE-4B70-87A9-E7BA74A6C5B5}" type="datetimeFigureOut">
               <a:rPr lang="bg-BG" smtClean="0"/>
-              <a:t>7.3.2017 г.</a:t>
+              <a:t>8.3.2017 г.</a:t>
             </a:fld>
             <a:endParaRPr lang="bg-BG"/>
           </a:p>
@@ -1817,7 +1827,7 @@
           <a:p>
             <a:fld id="{1C173AAD-17BE-4B70-87A9-E7BA74A6C5B5}" type="datetimeFigureOut">
               <a:rPr lang="bg-BG" smtClean="0"/>
-              <a:t>7.3.2017 г.</a:t>
+              <a:t>8.3.2017 г.</a:t>
             </a:fld>
             <a:endParaRPr lang="bg-BG"/>
           </a:p>
@@ -2094,7 +2104,7 @@
           <a:p>
             <a:fld id="{1C173AAD-17BE-4B70-87A9-E7BA74A6C5B5}" type="datetimeFigureOut">
               <a:rPr lang="bg-BG" smtClean="0"/>
-              <a:t>7.3.2017 г.</a:t>
+              <a:t>8.3.2017 г.</a:t>
             </a:fld>
             <a:endParaRPr lang="bg-BG"/>
           </a:p>
@@ -2347,7 +2357,7 @@
           <a:p>
             <a:fld id="{1C173AAD-17BE-4B70-87A9-E7BA74A6C5B5}" type="datetimeFigureOut">
               <a:rPr lang="bg-BG" smtClean="0"/>
-              <a:t>7.3.2017 г.</a:t>
+              <a:t>8.3.2017 г.</a:t>
             </a:fld>
             <a:endParaRPr lang="bg-BG"/>
           </a:p>
@@ -2560,7 +2570,7 @@
           <a:p>
             <a:fld id="{1C173AAD-17BE-4B70-87A9-E7BA74A6C5B5}" type="datetimeFigureOut">
               <a:rPr lang="bg-BG" smtClean="0"/>
-              <a:t>7.3.2017 г.</a:t>
+              <a:t>8.3.2017 г.</a:t>
             </a:fld>
             <a:endParaRPr lang="bg-BG"/>
           </a:p>
@@ -3539,6 +3549,369 @@
       </p:grpSpPr>
       <p:pic>
         <p:nvPicPr>
+          <p:cNvPr id="4" name="Picture 3"/>
+          <p:cNvPicPr>
+            <a:picLocks noChangeAspect="1"/>
+          </p:cNvPicPr>
+          <p:nvPr/>
+        </p:nvPicPr>
+        <p:blipFill>
+          <a:blip r:embed="rId2"/>
+          <a:stretch>
+            <a:fillRect/>
+          </a:stretch>
+        </p:blipFill>
+        <p:spPr>
+          <a:xfrm>
+            <a:off x="3981387" y="1449915"/>
+            <a:ext cx="3238810" cy="3843724"/>
+          </a:xfrm>
+          <a:prstGeom prst="rect">
+            <a:avLst/>
+          </a:prstGeom>
+        </p:spPr>
+      </p:pic>
+      <p:sp>
+        <p:nvSpPr>
+          <p:cNvPr id="6" name="AutoShape 5"/>
+          <p:cNvSpPr>
+            <a:spLocks noChangeArrowheads="1"/>
+          </p:cNvSpPr>
+          <p:nvPr/>
+        </p:nvSpPr>
+        <p:spPr bwMode="auto">
+          <a:xfrm>
+            <a:off x="2070100" y="2529272"/>
+            <a:ext cx="2564765" cy="772078"/>
+          </a:xfrm>
+          <a:prstGeom prst="wedgeRoundRectCallout">
+            <a:avLst>
+              <a:gd name="adj1" fmla="val 20462"/>
+              <a:gd name="adj2" fmla="val 31163"/>
+              <a:gd name="adj3" fmla="val 16667"/>
+            </a:avLst>
+          </a:prstGeom>
+          <a:solidFill>
+            <a:schemeClr val="bg1">
+              <a:lumMod val="85000"/>
+              <a:alpha val="94902"/>
+            </a:schemeClr>
+          </a:solidFill>
+          <a:ln w="19050">
+            <a:solidFill>
+              <a:schemeClr val="bg1">
+                <a:lumMod val="50000"/>
+                <a:alpha val="80000"/>
+              </a:schemeClr>
+            </a:solidFill>
+          </a:ln>
+        </p:spPr>
+        <p:style>
+          <a:lnRef idx="2">
+            <a:schemeClr val="accent1">
+              <a:shade val="50000"/>
+            </a:schemeClr>
+          </a:lnRef>
+          <a:fillRef idx="1">
+            <a:schemeClr val="accent1"/>
+          </a:fillRef>
+          <a:effectRef idx="0">
+            <a:schemeClr val="accent1"/>
+          </a:effectRef>
+          <a:fontRef idx="minor">
+            <a:schemeClr val="lt1"/>
+          </a:fontRef>
+        </p:style>
+        <p:txBody>
+          <a:bodyPr rot="0" spcFirstLastPara="0" vertOverflow="overflow" horzOverflow="overflow" vert="horz" wrap="square" lIns="91440" tIns="45720" rIns="91440" bIns="45720" numCol="1" spcCol="0" rtlCol="0" fromWordArt="0" anchor="ctr" anchorCtr="0" forceAA="0" compatLnSpc="1">
+            <a:prstTxWarp prst="textNoShape">
+              <a:avLst/>
+            </a:prstTxWarp>
+            <a:noAutofit/>
+          </a:bodyPr>
+          <a:lstStyle/>
+          <a:p>
+            <a:pPr algn="ctr"/>
+            <a:r>
+              <a:rPr lang="en-US" sz="2800" b="1" dirty="0" smtClean="0">
+                <a:solidFill>
+                  <a:schemeClr val="tx1"/>
+                </a:solidFill>
+                <a:effectLst>
+                  <a:outerShdw blurRad="38100" dist="38100" dir="2700000" algn="tl">
+                    <a:schemeClr val="bg1">
+                      <a:alpha val="43000"/>
+                    </a:schemeClr>
+                  </a:outerShdw>
+                </a:effectLst>
+              </a:rPr>
+              <a:t>n</a:t>
+            </a:r>
+            <a:r>
+              <a:rPr lang="bg-BG" sz="2800" b="1" dirty="0" smtClean="0">
+                <a:solidFill>
+                  <a:schemeClr val="tx1"/>
+                </a:solidFill>
+                <a:effectLst>
+                  <a:outerShdw blurRad="38100" dist="38100" dir="2700000" algn="tl">
+                    <a:schemeClr val="bg1">
+                      <a:alpha val="43000"/>
+                    </a:schemeClr>
+                  </a:outerShdw>
+                </a:effectLst>
+              </a:rPr>
+              <a:t> </a:t>
+            </a:r>
+            <a:r>
+              <a:rPr lang="en-US" sz="2800" b="1" dirty="0" smtClean="0">
+                <a:solidFill>
+                  <a:schemeClr val="tx1"/>
+                </a:solidFill>
+                <a:effectLst>
+                  <a:outerShdw blurRad="38100" dist="38100" dir="2700000" algn="tl">
+                    <a:schemeClr val="bg1">
+                      <a:alpha val="43000"/>
+                    </a:schemeClr>
+                  </a:outerShdw>
+                </a:effectLst>
+              </a:rPr>
+              <a:t>-</a:t>
+            </a:r>
+            <a:r>
+              <a:rPr lang="bg-BG" sz="2800" b="1" dirty="0" smtClean="0">
+                <a:solidFill>
+                  <a:schemeClr val="tx1"/>
+                </a:solidFill>
+                <a:effectLst>
+                  <a:outerShdw blurRad="38100" dist="38100" dir="2700000" algn="tl">
+                    <a:schemeClr val="bg1">
+                      <a:alpha val="43000"/>
+                    </a:schemeClr>
+                  </a:outerShdw>
+                </a:effectLst>
+              </a:rPr>
+              <a:t> </a:t>
+            </a:r>
+            <a:r>
+              <a:rPr lang="en-US" sz="2800" b="1" dirty="0" smtClean="0">
+                <a:solidFill>
+                  <a:schemeClr val="tx1"/>
+                </a:solidFill>
+                <a:effectLst>
+                  <a:outerShdw blurRad="38100" dist="38100" dir="2700000" algn="tl">
+                    <a:schemeClr val="bg1">
+                      <a:alpha val="43000"/>
+                    </a:schemeClr>
+                  </a:outerShdw>
+                </a:effectLst>
+              </a:rPr>
+              <a:t>3 </a:t>
+            </a:r>
+            <a:r>
+              <a:rPr lang="bg-BG" sz="2800" b="1" dirty="0" smtClean="0">
+                <a:solidFill>
+                  <a:schemeClr val="tx1"/>
+                </a:solidFill>
+                <a:effectLst>
+                  <a:outerShdw blurRad="38100" dist="38100" dir="2700000" algn="tl">
+                    <a:schemeClr val="bg1">
+                      <a:alpha val="43000"/>
+                    </a:schemeClr>
+                  </a:outerShdw>
+                </a:effectLst>
+              </a:rPr>
+              <a:t> еднакви реда</a:t>
+            </a:r>
+            <a:endParaRPr lang="bg-BG" sz="2800" b="1" dirty="0">
+              <a:solidFill>
+                <a:schemeClr val="tx1"/>
+              </a:solidFill>
+              <a:effectLst>
+                <a:outerShdw blurRad="38100" dist="38100" dir="2700000" algn="tl">
+                  <a:schemeClr val="bg1">
+                    <a:alpha val="43000"/>
+                  </a:schemeClr>
+                </a:outerShdw>
+              </a:effectLst>
+            </a:endParaRPr>
+          </a:p>
+        </p:txBody>
+      </p:sp>
+      <p:sp>
+        <p:nvSpPr>
+          <p:cNvPr id="12" name="Left Brace 11"/>
+          <p:cNvSpPr/>
+          <p:nvPr/>
+        </p:nvSpPr>
+        <p:spPr>
+          <a:xfrm>
+            <a:off x="4773881" y="2618822"/>
+            <a:ext cx="391884" cy="669828"/>
+          </a:xfrm>
+          <a:prstGeom prst="leftBrace">
+            <a:avLst>
+              <a:gd name="adj1" fmla="val 38906"/>
+              <a:gd name="adj2" fmla="val 45524"/>
+            </a:avLst>
+          </a:prstGeom>
+          <a:solidFill>
+            <a:schemeClr val="bg1">
+              <a:lumMod val="85000"/>
+              <a:alpha val="94902"/>
+            </a:schemeClr>
+          </a:solidFill>
+          <a:ln w="19050">
+            <a:solidFill>
+              <a:schemeClr val="bg1">
+                <a:lumMod val="50000"/>
+                <a:alpha val="80000"/>
+              </a:schemeClr>
+            </a:solidFill>
+          </a:ln>
+        </p:spPr>
+        <p:style>
+          <a:lnRef idx="2">
+            <a:schemeClr val="accent1">
+              <a:shade val="50000"/>
+            </a:schemeClr>
+          </a:lnRef>
+          <a:fillRef idx="1">
+            <a:schemeClr val="accent1"/>
+          </a:fillRef>
+          <a:effectRef idx="0">
+            <a:schemeClr val="accent1"/>
+          </a:effectRef>
+          <a:fontRef idx="minor">
+            <a:schemeClr val="lt1"/>
+          </a:fontRef>
+        </p:style>
+        <p:txBody>
+          <a:bodyPr rtlCol="0" anchor="ctr"/>
+          <a:lstStyle/>
+          <a:p>
+            <a:pPr algn="ctr"/>
+            <a:endParaRPr lang="bg-BG" sz="2800" b="1">
+              <a:effectLst>
+                <a:outerShdw blurRad="38100" dist="38100" dir="2700000" algn="tl">
+                  <a:schemeClr val="bg1">
+                    <a:alpha val="43000"/>
+                  </a:schemeClr>
+                </a:outerShdw>
+              </a:effectLst>
+            </a:endParaRPr>
+          </a:p>
+        </p:txBody>
+      </p:sp>
+    </p:spTree>
+    <p:extLst>
+      <p:ext uri="{BB962C8B-B14F-4D97-AF65-F5344CB8AC3E}">
+        <p14:creationId xmlns:p14="http://schemas.microsoft.com/office/powerpoint/2010/main" val="2889193672"/>
+      </p:ext>
+    </p:extLst>
+  </p:cSld>
+  <p:clrMapOvr>
+    <a:masterClrMapping/>
+  </p:clrMapOvr>
+  <p:timing>
+    <p:tnLst>
+      <p:par>
+        <p:cTn id="1" dur="indefinite" restart="never" nodeType="tmRoot">
+          <p:childTnLst>
+            <p:seq concurrent="1" nextAc="seek">
+              <p:cTn id="2" dur="indefinite" nodeType="mainSeq">
+                <p:childTnLst>
+                  <p:par>
+                    <p:cTn id="3" fill="hold">
+                      <p:stCondLst>
+                        <p:cond delay="indefinite"/>
+                      </p:stCondLst>
+                      <p:childTnLst>
+                        <p:par>
+                          <p:cTn id="4" fill="hold">
+                            <p:stCondLst>
+                              <p:cond delay="0"/>
+                            </p:stCondLst>
+                            <p:childTnLst>
+                              <p:par>
+                                <p:cTn id="5" presetID="1" presetClass="entr" presetSubtype="0" fill="hold" grpId="0" nodeType="clickEffect">
+                                  <p:stCondLst>
+                                    <p:cond delay="0"/>
+                                  </p:stCondLst>
+                                  <p:childTnLst>
+                                    <p:set>
+                                      <p:cBhvr>
+                                        <p:cTn id="6" dur="1" fill="hold">
+                                          <p:stCondLst>
+                                            <p:cond delay="0"/>
+                                          </p:stCondLst>
+                                        </p:cTn>
+                                        <p:tgtEl>
+                                          <p:spTgt spid="6"/>
+                                        </p:tgtEl>
+                                        <p:attrNameLst>
+                                          <p:attrName>style.visibility</p:attrName>
+                                        </p:attrNameLst>
+                                      </p:cBhvr>
+                                      <p:to>
+                                        <p:strVal val="visible"/>
+                                      </p:to>
+                                    </p:set>
+                                  </p:childTnLst>
+                                </p:cTn>
+                              </p:par>
+                            </p:childTnLst>
+                          </p:cTn>
+                        </p:par>
+                      </p:childTnLst>
+                    </p:cTn>
+                  </p:par>
+                </p:childTnLst>
+              </p:cTn>
+              <p:prevCondLst>
+                <p:cond evt="onPrev" delay="0">
+                  <p:tgtEl>
+                    <p:sldTgt/>
+                  </p:tgtEl>
+                </p:cond>
+              </p:prevCondLst>
+              <p:nextCondLst>
+                <p:cond evt="onNext" delay="0">
+                  <p:tgtEl>
+                    <p:sldTgt/>
+                  </p:tgtEl>
+                </p:cond>
+              </p:nextCondLst>
+            </p:seq>
+          </p:childTnLst>
+        </p:cTn>
+      </p:par>
+    </p:tnLst>
+    <p:bldLst>
+      <p:bldP spid="6" grpId="0" animBg="1"/>
+    </p:bldLst>
+  </p:timing>
+</p:sld>
+</file>
+
+<file path=ppt/slides/slide3.xml><?xml version="1.0" encoding="utf-8"?>
+<p:sld xmlns:a="http://schemas.openxmlformats.org/drawingml/2006/main" xmlns:r="http://schemas.openxmlformats.org/officeDocument/2006/relationships" xmlns:p="http://schemas.openxmlformats.org/presentationml/2006/main">
+  <p:cSld>
+    <p:spTree>
+      <p:nvGrpSpPr>
+        <p:cNvPr id="1" name=""/>
+        <p:cNvGrpSpPr/>
+        <p:nvPr/>
+      </p:nvGrpSpPr>
+      <p:grpSpPr>
+        <a:xfrm>
+          <a:off x="0" y="0"/>
+          <a:ext cx="0" cy="0"/>
+          <a:chOff x="0" y="0"/>
+          <a:chExt cx="0" cy="0"/>
+        </a:xfrm>
+      </p:grpSpPr>
+      <p:pic>
+        <p:nvPicPr>
           <p:cNvPr id="2" name="Picture 1"/>
           <p:cNvPicPr>
             <a:picLocks noChangeAspect="1"/>
@@ -4087,6 +4460,1880 @@
     <p:bldLst>
       <p:bldP spid="6" grpId="0" animBg="1"/>
       <p:bldP spid="7" grpId="0" animBg="1"/>
+    </p:bldLst>
+  </p:timing>
+</p:sld>
+</file>
+
+<file path=ppt/slides/slide4.xml><?xml version="1.0" encoding="utf-8"?>
+<p:sld xmlns:a="http://schemas.openxmlformats.org/drawingml/2006/main" xmlns:r="http://schemas.openxmlformats.org/officeDocument/2006/relationships" xmlns:p="http://schemas.openxmlformats.org/presentationml/2006/main">
+  <p:cSld>
+    <p:spTree>
+      <p:nvGrpSpPr>
+        <p:cNvPr id="1" name=""/>
+        <p:cNvGrpSpPr/>
+        <p:nvPr/>
+      </p:nvGrpSpPr>
+      <p:grpSpPr>
+        <a:xfrm>
+          <a:off x="0" y="0"/>
+          <a:ext cx="0" cy="0"/>
+          <a:chOff x="0" y="0"/>
+          <a:chExt cx="0" cy="0"/>
+        </a:xfrm>
+      </p:grpSpPr>
+      <p:pic>
+        <p:nvPicPr>
+          <p:cNvPr id="2" name="Picture 1"/>
+          <p:cNvPicPr>
+            <a:picLocks noChangeAspect="1"/>
+          </p:cNvPicPr>
+          <p:nvPr/>
+        </p:nvPicPr>
+        <p:blipFill>
+          <a:blip r:embed="rId2"/>
+          <a:stretch>
+            <a:fillRect/>
+          </a:stretch>
+        </p:blipFill>
+        <p:spPr>
+          <a:xfrm>
+            <a:off x="3327083" y="1366788"/>
+            <a:ext cx="4286258" cy="3843724"/>
+          </a:xfrm>
+          <a:prstGeom prst="rect">
+            <a:avLst/>
+          </a:prstGeom>
+        </p:spPr>
+      </p:pic>
+      <p:sp>
+        <p:nvSpPr>
+          <p:cNvPr id="6" name="AutoShape 5"/>
+          <p:cNvSpPr>
+            <a:spLocks noChangeArrowheads="1"/>
+          </p:cNvSpPr>
+          <p:nvPr/>
+        </p:nvSpPr>
+        <p:spPr bwMode="auto">
+          <a:xfrm>
+            <a:off x="2446833" y="3015518"/>
+            <a:ext cx="1584556" cy="546264"/>
+          </a:xfrm>
+          <a:prstGeom prst="wedgeRoundRectCallout">
+            <a:avLst>
+              <a:gd name="adj1" fmla="val 20462"/>
+              <a:gd name="adj2" fmla="val 31163"/>
+              <a:gd name="adj3" fmla="val 16667"/>
+            </a:avLst>
+          </a:prstGeom>
+          <a:solidFill>
+            <a:schemeClr val="bg1">
+              <a:lumMod val="85000"/>
+              <a:alpha val="94902"/>
+            </a:schemeClr>
+          </a:solidFill>
+          <a:ln w="19050">
+            <a:solidFill>
+              <a:schemeClr val="bg1">
+                <a:lumMod val="50000"/>
+                <a:alpha val="80000"/>
+              </a:schemeClr>
+            </a:solidFill>
+          </a:ln>
+        </p:spPr>
+        <p:style>
+          <a:lnRef idx="2">
+            <a:schemeClr val="accent1">
+              <a:shade val="50000"/>
+            </a:schemeClr>
+          </a:lnRef>
+          <a:fillRef idx="1">
+            <a:schemeClr val="accent1"/>
+          </a:fillRef>
+          <a:effectRef idx="0">
+            <a:schemeClr val="accent1"/>
+          </a:effectRef>
+          <a:fontRef idx="minor">
+            <a:schemeClr val="lt1"/>
+          </a:fontRef>
+        </p:style>
+        <p:txBody>
+          <a:bodyPr rot="0" spcFirstLastPara="0" vertOverflow="overflow" horzOverflow="overflow" vert="horz" wrap="square" lIns="91440" tIns="45720" rIns="91440" bIns="45720" numCol="1" spcCol="0" rtlCol="0" fromWordArt="0" anchor="ctr" anchorCtr="0" forceAA="0" compatLnSpc="1">
+            <a:prstTxWarp prst="textNoShape">
+              <a:avLst/>
+            </a:prstTxWarp>
+            <a:noAutofit/>
+          </a:bodyPr>
+          <a:lstStyle/>
+          <a:p>
+            <a:pPr algn="ctr"/>
+            <a:r>
+              <a:rPr lang="bg-BG" sz="2800" b="1" dirty="0" smtClean="0">
+                <a:solidFill>
+                  <a:schemeClr val="tx1"/>
+                </a:solidFill>
+                <a:effectLst>
+                  <a:outerShdw blurRad="38100" dist="38100" dir="2700000" algn="tl">
+                    <a:schemeClr val="bg1">
+                      <a:alpha val="43000"/>
+                    </a:schemeClr>
+                  </a:outerShdw>
+                </a:effectLst>
+              </a:rPr>
+              <a:t>Стени</a:t>
+            </a:r>
+            <a:endParaRPr lang="bg-BG" sz="2800" b="1" dirty="0">
+              <a:solidFill>
+                <a:schemeClr val="tx1"/>
+              </a:solidFill>
+              <a:effectLst>
+                <a:outerShdw blurRad="38100" dist="38100" dir="2700000" algn="tl">
+                  <a:schemeClr val="bg1">
+                    <a:alpha val="43000"/>
+                  </a:schemeClr>
+                </a:outerShdw>
+              </a:effectLst>
+            </a:endParaRPr>
+          </a:p>
+        </p:txBody>
+      </p:sp>
+      <p:sp>
+        <p:nvSpPr>
+          <p:cNvPr id="9" name="Right Brace 8"/>
+          <p:cNvSpPr/>
+          <p:nvPr/>
+        </p:nvSpPr>
+        <p:spPr>
+          <a:xfrm>
+            <a:off x="7346145" y="4385554"/>
+            <a:ext cx="356261" cy="632517"/>
+          </a:xfrm>
+          <a:prstGeom prst="rightBrace">
+            <a:avLst>
+              <a:gd name="adj1" fmla="val 78333"/>
+              <a:gd name="adj2" fmla="val 50000"/>
+            </a:avLst>
+          </a:prstGeom>
+          <a:solidFill>
+            <a:schemeClr val="bg1">
+              <a:lumMod val="85000"/>
+              <a:alpha val="94902"/>
+            </a:schemeClr>
+          </a:solidFill>
+          <a:ln w="19050">
+            <a:solidFill>
+              <a:schemeClr val="bg1">
+                <a:lumMod val="50000"/>
+                <a:alpha val="80000"/>
+              </a:schemeClr>
+            </a:solidFill>
+          </a:ln>
+        </p:spPr>
+        <p:style>
+          <a:lnRef idx="2">
+            <a:schemeClr val="accent1">
+              <a:shade val="50000"/>
+            </a:schemeClr>
+          </a:lnRef>
+          <a:fillRef idx="1">
+            <a:schemeClr val="accent1"/>
+          </a:fillRef>
+          <a:effectRef idx="0">
+            <a:schemeClr val="accent1"/>
+          </a:effectRef>
+          <a:fontRef idx="minor">
+            <a:schemeClr val="lt1"/>
+          </a:fontRef>
+        </p:style>
+        <p:txBody>
+          <a:bodyPr rtlCol="0" anchor="ctr"/>
+          <a:lstStyle/>
+          <a:p>
+            <a:pPr algn="ctr"/>
+            <a:endParaRPr lang="bg-BG" sz="2800" b="1">
+              <a:effectLst>
+                <a:outerShdw blurRad="38100" dist="38100" dir="2700000" algn="tl">
+                  <a:schemeClr val="bg1">
+                    <a:alpha val="43000"/>
+                  </a:schemeClr>
+                </a:outerShdw>
+              </a:effectLst>
+            </a:endParaRPr>
+          </a:p>
+        </p:txBody>
+      </p:sp>
+      <p:sp>
+        <p:nvSpPr>
+          <p:cNvPr id="12" name="Left Brace 11"/>
+          <p:cNvSpPr/>
+          <p:nvPr/>
+        </p:nvSpPr>
+        <p:spPr>
+          <a:xfrm>
+            <a:off x="4131204" y="2535694"/>
+            <a:ext cx="391884" cy="1715671"/>
+          </a:xfrm>
+          <a:prstGeom prst="leftBrace">
+            <a:avLst>
+              <a:gd name="adj1" fmla="val 38906"/>
+              <a:gd name="adj2" fmla="val 45524"/>
+            </a:avLst>
+          </a:prstGeom>
+          <a:solidFill>
+            <a:schemeClr val="bg1">
+              <a:lumMod val="85000"/>
+              <a:alpha val="94902"/>
+            </a:schemeClr>
+          </a:solidFill>
+          <a:ln w="19050">
+            <a:solidFill>
+              <a:schemeClr val="bg1">
+                <a:lumMod val="50000"/>
+                <a:alpha val="80000"/>
+              </a:schemeClr>
+            </a:solidFill>
+          </a:ln>
+        </p:spPr>
+        <p:style>
+          <a:lnRef idx="2">
+            <a:schemeClr val="accent1">
+              <a:shade val="50000"/>
+            </a:schemeClr>
+          </a:lnRef>
+          <a:fillRef idx="1">
+            <a:schemeClr val="accent1"/>
+          </a:fillRef>
+          <a:effectRef idx="0">
+            <a:schemeClr val="accent1"/>
+          </a:effectRef>
+          <a:fontRef idx="minor">
+            <a:schemeClr val="lt1"/>
+          </a:fontRef>
+        </p:style>
+        <p:txBody>
+          <a:bodyPr rtlCol="0" anchor="ctr"/>
+          <a:lstStyle/>
+          <a:p>
+            <a:pPr algn="ctr"/>
+            <a:endParaRPr lang="bg-BG" sz="2800" b="1">
+              <a:effectLst>
+                <a:outerShdw blurRad="38100" dist="38100" dir="2700000" algn="tl">
+                  <a:schemeClr val="bg1">
+                    <a:alpha val="43000"/>
+                  </a:schemeClr>
+                </a:outerShdw>
+              </a:effectLst>
+            </a:endParaRPr>
+          </a:p>
+        </p:txBody>
+      </p:sp>
+    </p:spTree>
+    <p:extLst>
+      <p:ext uri="{BB962C8B-B14F-4D97-AF65-F5344CB8AC3E}">
+        <p14:creationId xmlns:p14="http://schemas.microsoft.com/office/powerpoint/2010/main" val="3476010527"/>
+      </p:ext>
+    </p:extLst>
+  </p:cSld>
+  <p:clrMapOvr>
+    <a:masterClrMapping/>
+  </p:clrMapOvr>
+  <p:timing>
+    <p:tnLst>
+      <p:par>
+        <p:cTn id="1" dur="indefinite" restart="never" nodeType="tmRoot">
+          <p:childTnLst>
+            <p:seq concurrent="1" nextAc="seek">
+              <p:cTn id="2" dur="indefinite" nodeType="mainSeq">
+                <p:childTnLst>
+                  <p:par>
+                    <p:cTn id="3" fill="hold">
+                      <p:stCondLst>
+                        <p:cond delay="indefinite"/>
+                      </p:stCondLst>
+                      <p:childTnLst>
+                        <p:par>
+                          <p:cTn id="4" fill="hold">
+                            <p:stCondLst>
+                              <p:cond delay="0"/>
+                            </p:stCondLst>
+                            <p:childTnLst>
+                              <p:par>
+                                <p:cTn id="5" presetID="1" presetClass="entr" presetSubtype="0" fill="hold" grpId="0" nodeType="clickEffect">
+                                  <p:stCondLst>
+                                    <p:cond delay="0"/>
+                                  </p:stCondLst>
+                                  <p:childTnLst>
+                                    <p:set>
+                                      <p:cBhvr>
+                                        <p:cTn id="6" dur="1" fill="hold">
+                                          <p:stCondLst>
+                                            <p:cond delay="0"/>
+                                          </p:stCondLst>
+                                        </p:cTn>
+                                        <p:tgtEl>
+                                          <p:spTgt spid="6"/>
+                                        </p:tgtEl>
+                                        <p:attrNameLst>
+                                          <p:attrName>style.visibility</p:attrName>
+                                        </p:attrNameLst>
+                                      </p:cBhvr>
+                                      <p:to>
+                                        <p:strVal val="visible"/>
+                                      </p:to>
+                                    </p:set>
+                                  </p:childTnLst>
+                                </p:cTn>
+                              </p:par>
+                            </p:childTnLst>
+                          </p:cTn>
+                        </p:par>
+                      </p:childTnLst>
+                    </p:cTn>
+                  </p:par>
+                </p:childTnLst>
+              </p:cTn>
+              <p:prevCondLst>
+                <p:cond evt="onPrev" delay="0">
+                  <p:tgtEl>
+                    <p:sldTgt/>
+                  </p:tgtEl>
+                </p:cond>
+              </p:prevCondLst>
+              <p:nextCondLst>
+                <p:cond evt="onNext" delay="0">
+                  <p:tgtEl>
+                    <p:sldTgt/>
+                  </p:tgtEl>
+                </p:cond>
+              </p:nextCondLst>
+            </p:seq>
+          </p:childTnLst>
+        </p:cTn>
+      </p:par>
+    </p:tnLst>
+    <p:bldLst>
+      <p:bldP spid="6" grpId="0" animBg="1"/>
+    </p:bldLst>
+  </p:timing>
+</p:sld>
+</file>
+
+<file path=ppt/slides/slide5.xml><?xml version="1.0" encoding="utf-8"?>
+<p:sld xmlns:a="http://schemas.openxmlformats.org/drawingml/2006/main" xmlns:r="http://schemas.openxmlformats.org/officeDocument/2006/relationships" xmlns:p="http://schemas.openxmlformats.org/presentationml/2006/main">
+  <p:cSld>
+    <p:spTree>
+      <p:nvGrpSpPr>
+        <p:cNvPr id="1" name=""/>
+        <p:cNvGrpSpPr/>
+        <p:nvPr/>
+      </p:nvGrpSpPr>
+      <p:grpSpPr>
+        <a:xfrm>
+          <a:off x="0" y="0"/>
+          <a:ext cx="0" cy="0"/>
+          <a:chOff x="0" y="0"/>
+          <a:chExt cx="0" cy="0"/>
+        </a:xfrm>
+      </p:grpSpPr>
+      <p:pic>
+        <p:nvPicPr>
+          <p:cNvPr id="7" name="Picture 6"/>
+          <p:cNvPicPr>
+            <a:picLocks noChangeAspect="1"/>
+          </p:cNvPicPr>
+          <p:nvPr/>
+        </p:nvPicPr>
+        <p:blipFill>
+          <a:blip r:embed="rId2"/>
+          <a:stretch>
+            <a:fillRect/>
+          </a:stretch>
+        </p:blipFill>
+        <p:spPr>
+          <a:xfrm>
+            <a:off x="2884487" y="2692080"/>
+            <a:ext cx="5272633" cy="665163"/>
+          </a:xfrm>
+          <a:prstGeom prst="rect">
+            <a:avLst/>
+          </a:prstGeom>
+        </p:spPr>
+      </p:pic>
+      <p:sp>
+        <p:nvSpPr>
+          <p:cNvPr id="8" name="AutoShape 5"/>
+          <p:cNvSpPr>
+            <a:spLocks noChangeArrowheads="1"/>
+          </p:cNvSpPr>
+          <p:nvPr/>
+        </p:nvSpPr>
+        <p:spPr bwMode="auto">
+          <a:xfrm>
+            <a:off x="2623344" y="1784733"/>
+            <a:ext cx="866986" cy="546264"/>
+          </a:xfrm>
+          <a:prstGeom prst="wedgeRoundRectCallout">
+            <a:avLst>
+              <a:gd name="adj1" fmla="val 20462"/>
+              <a:gd name="adj2" fmla="val 31163"/>
+              <a:gd name="adj3" fmla="val 16667"/>
+            </a:avLst>
+          </a:prstGeom>
+          <a:solidFill>
+            <a:schemeClr val="bg1">
+              <a:lumMod val="85000"/>
+              <a:alpha val="94902"/>
+            </a:schemeClr>
+          </a:solidFill>
+          <a:ln w="19050">
+            <a:solidFill>
+              <a:schemeClr val="bg1">
+                <a:lumMod val="50000"/>
+                <a:alpha val="80000"/>
+              </a:schemeClr>
+            </a:solidFill>
+          </a:ln>
+        </p:spPr>
+        <p:style>
+          <a:lnRef idx="2">
+            <a:schemeClr val="accent1">
+              <a:shade val="50000"/>
+            </a:schemeClr>
+          </a:lnRef>
+          <a:fillRef idx="1">
+            <a:schemeClr val="accent1"/>
+          </a:fillRef>
+          <a:effectRef idx="0">
+            <a:schemeClr val="accent1"/>
+          </a:effectRef>
+          <a:fontRef idx="minor">
+            <a:schemeClr val="lt1"/>
+          </a:fontRef>
+        </p:style>
+        <p:txBody>
+          <a:bodyPr rot="0" spcFirstLastPara="0" vertOverflow="overflow" horzOverflow="overflow" vert="horz" wrap="square" lIns="91440" tIns="45720" rIns="91440" bIns="45720" numCol="1" spcCol="0" rtlCol="0" fromWordArt="0" anchor="ctr" anchorCtr="0" forceAA="0" compatLnSpc="1">
+            <a:prstTxWarp prst="textNoShape">
+              <a:avLst/>
+            </a:prstTxWarp>
+            <a:noAutofit/>
+          </a:bodyPr>
+          <a:lstStyle/>
+          <a:p>
+            <a:pPr algn="ctr"/>
+            <a:r>
+              <a:rPr lang="en-US" sz="2800" b="1" dirty="0" smtClean="0">
+                <a:solidFill>
+                  <a:schemeClr val="tx1"/>
+                </a:solidFill>
+                <a:effectLst>
+                  <a:outerShdw blurRad="38100" dist="38100" dir="2700000" algn="tl">
+                    <a:schemeClr val="bg1">
+                      <a:alpha val="43000"/>
+                    </a:schemeClr>
+                  </a:outerShdw>
+                </a:effectLst>
+              </a:rPr>
+              <a:t>n=8</a:t>
+            </a:r>
+            <a:endParaRPr lang="bg-BG" sz="2800" b="1" dirty="0">
+              <a:solidFill>
+                <a:schemeClr val="tx1"/>
+              </a:solidFill>
+              <a:effectLst>
+                <a:outerShdw blurRad="38100" dist="38100" dir="2700000" algn="tl">
+                  <a:schemeClr val="bg1">
+                    <a:alpha val="43000"/>
+                  </a:schemeClr>
+                </a:outerShdw>
+              </a:effectLst>
+            </a:endParaRPr>
+          </a:p>
+        </p:txBody>
+      </p:sp>
+      <p:sp>
+        <p:nvSpPr>
+          <p:cNvPr id="9" name="AutoShape 6"/>
+          <p:cNvSpPr>
+            <a:spLocks noChangeArrowheads="1"/>
+          </p:cNvSpPr>
+          <p:nvPr/>
+        </p:nvSpPr>
+        <p:spPr bwMode="auto">
+          <a:xfrm>
+            <a:off x="5366228" y="3677870"/>
+            <a:ext cx="3180872" cy="657899"/>
+          </a:xfrm>
+          <a:prstGeom prst="wedgeRoundRectCallout">
+            <a:avLst>
+              <a:gd name="adj1" fmla="val -43463"/>
+              <a:gd name="adj2" fmla="val -98707"/>
+              <a:gd name="adj3" fmla="val 16667"/>
+            </a:avLst>
+          </a:prstGeom>
+          <a:solidFill>
+            <a:schemeClr val="bg1">
+              <a:lumMod val="85000"/>
+              <a:alpha val="94902"/>
+            </a:schemeClr>
+          </a:solidFill>
+          <a:ln w="19050">
+            <a:solidFill>
+              <a:schemeClr val="bg1">
+                <a:lumMod val="50000"/>
+                <a:alpha val="80000"/>
+              </a:schemeClr>
+            </a:solidFill>
+          </a:ln>
+        </p:spPr>
+        <p:style>
+          <a:lnRef idx="2">
+            <a:schemeClr val="accent1">
+              <a:shade val="50000"/>
+            </a:schemeClr>
+          </a:lnRef>
+          <a:fillRef idx="1">
+            <a:schemeClr val="accent1"/>
+          </a:fillRef>
+          <a:effectRef idx="0">
+            <a:schemeClr val="accent1"/>
+          </a:effectRef>
+          <a:fontRef idx="minor">
+            <a:schemeClr val="lt1"/>
+          </a:fontRef>
+        </p:style>
+        <p:txBody>
+          <a:bodyPr rot="0" spcFirstLastPara="0" vertOverflow="overflow" horzOverflow="overflow" vert="horz" wrap="square" lIns="91440" tIns="45720" rIns="91440" bIns="45720" numCol="1" spcCol="0" rtlCol="0" fromWordArt="0" anchor="ctr" anchorCtr="0" forceAA="0" compatLnSpc="1">
+            <a:prstTxWarp prst="textNoShape">
+              <a:avLst/>
+            </a:prstTxWarp>
+            <a:noAutofit/>
+          </a:bodyPr>
+          <a:lstStyle/>
+          <a:p>
+            <a:pPr algn="ctr"/>
+            <a:r>
+              <a:rPr lang="bg-BG" sz="2800" b="1" dirty="0" smtClean="0">
+                <a:solidFill>
+                  <a:schemeClr val="tx1"/>
+                </a:solidFill>
+                <a:effectLst>
+                  <a:outerShdw blurRad="38100" dist="38100" dir="2700000" algn="tl">
+                    <a:schemeClr val="bg1">
+                      <a:alpha val="43000"/>
+                    </a:schemeClr>
+                  </a:outerShdw>
+                </a:effectLst>
+              </a:rPr>
+              <a:t>Междинен покрив</a:t>
+            </a:r>
+            <a:endParaRPr lang="bg-BG" sz="2800" b="1" dirty="0">
+              <a:solidFill>
+                <a:schemeClr val="tx1"/>
+              </a:solidFill>
+              <a:effectLst>
+                <a:outerShdw blurRad="38100" dist="38100" dir="2700000" algn="tl">
+                  <a:schemeClr val="bg1">
+                    <a:alpha val="43000"/>
+                  </a:schemeClr>
+                </a:outerShdw>
+              </a:effectLst>
+            </a:endParaRPr>
+          </a:p>
+        </p:txBody>
+      </p:sp>
+      <p:sp>
+        <p:nvSpPr>
+          <p:cNvPr id="10" name="AutoShape 6"/>
+          <p:cNvSpPr>
+            <a:spLocks noChangeArrowheads="1"/>
+          </p:cNvSpPr>
+          <p:nvPr/>
+        </p:nvSpPr>
+        <p:spPr bwMode="auto">
+          <a:xfrm>
+            <a:off x="4014156" y="1784731"/>
+            <a:ext cx="1352072" cy="657899"/>
+          </a:xfrm>
+          <a:prstGeom prst="wedgeRoundRectCallout">
+            <a:avLst>
+              <a:gd name="adj1" fmla="val -42664"/>
+              <a:gd name="adj2" fmla="val 82749"/>
+              <a:gd name="adj3" fmla="val 16667"/>
+            </a:avLst>
+          </a:prstGeom>
+          <a:solidFill>
+            <a:schemeClr val="bg1">
+              <a:lumMod val="85000"/>
+              <a:alpha val="94902"/>
+            </a:schemeClr>
+          </a:solidFill>
+          <a:ln w="19050">
+            <a:solidFill>
+              <a:schemeClr val="bg1">
+                <a:lumMod val="50000"/>
+                <a:alpha val="80000"/>
+              </a:schemeClr>
+            </a:solidFill>
+          </a:ln>
+        </p:spPr>
+        <p:style>
+          <a:lnRef idx="2">
+            <a:schemeClr val="accent1">
+              <a:shade val="50000"/>
+            </a:schemeClr>
+          </a:lnRef>
+          <a:fillRef idx="1">
+            <a:schemeClr val="accent1"/>
+          </a:fillRef>
+          <a:effectRef idx="0">
+            <a:schemeClr val="accent1"/>
+          </a:effectRef>
+          <a:fontRef idx="minor">
+            <a:schemeClr val="lt1"/>
+          </a:fontRef>
+        </p:style>
+        <p:txBody>
+          <a:bodyPr rot="0" spcFirstLastPara="0" vertOverflow="overflow" horzOverflow="overflow" vert="horz" wrap="square" lIns="91440" tIns="45720" rIns="91440" bIns="45720" numCol="1" spcCol="0" rtlCol="0" fromWordArt="0" anchor="ctr" anchorCtr="0" forceAA="0" compatLnSpc="1">
+            <a:prstTxWarp prst="textNoShape">
+              <a:avLst/>
+            </a:prstTxWarp>
+            <a:noAutofit/>
+          </a:bodyPr>
+          <a:lstStyle/>
+          <a:p>
+            <a:pPr algn="ctr"/>
+            <a:r>
+              <a:rPr lang="bg-BG" sz="2800" b="1" dirty="0" smtClean="0">
+                <a:solidFill>
+                  <a:schemeClr val="tx1"/>
+                </a:solidFill>
+                <a:effectLst>
+                  <a:outerShdw blurRad="38100" dist="38100" dir="2700000" algn="tl">
+                    <a:schemeClr val="bg1">
+                      <a:alpha val="43000"/>
+                    </a:schemeClr>
+                  </a:outerShdw>
+                </a:effectLst>
+              </a:rPr>
+              <a:t>Кула</a:t>
+            </a:r>
+            <a:endParaRPr lang="bg-BG" sz="2800" b="1" dirty="0">
+              <a:solidFill>
+                <a:schemeClr val="tx1"/>
+              </a:solidFill>
+              <a:effectLst>
+                <a:outerShdw blurRad="38100" dist="38100" dir="2700000" algn="tl">
+                  <a:schemeClr val="bg1">
+                    <a:alpha val="43000"/>
+                  </a:schemeClr>
+                </a:outerShdw>
+              </a:effectLst>
+            </a:endParaRPr>
+          </a:p>
+        </p:txBody>
+      </p:sp>
+      <p:sp>
+        <p:nvSpPr>
+          <p:cNvPr id="11" name="AutoShape 6"/>
+          <p:cNvSpPr>
+            <a:spLocks noChangeArrowheads="1"/>
+          </p:cNvSpPr>
+          <p:nvPr/>
+        </p:nvSpPr>
+        <p:spPr bwMode="auto">
+          <a:xfrm>
+            <a:off x="6956664" y="1766063"/>
+            <a:ext cx="1352072" cy="657899"/>
+          </a:xfrm>
+          <a:prstGeom prst="wedgeRoundRectCallout">
+            <a:avLst>
+              <a:gd name="adj1" fmla="val -42664"/>
+              <a:gd name="adj2" fmla="val 82749"/>
+              <a:gd name="adj3" fmla="val 16667"/>
+            </a:avLst>
+          </a:prstGeom>
+          <a:solidFill>
+            <a:schemeClr val="bg1">
+              <a:lumMod val="85000"/>
+              <a:alpha val="94902"/>
+            </a:schemeClr>
+          </a:solidFill>
+          <a:ln w="19050">
+            <a:solidFill>
+              <a:schemeClr val="bg1">
+                <a:lumMod val="50000"/>
+                <a:alpha val="80000"/>
+              </a:schemeClr>
+            </a:solidFill>
+          </a:ln>
+        </p:spPr>
+        <p:style>
+          <a:lnRef idx="2">
+            <a:schemeClr val="accent1">
+              <a:shade val="50000"/>
+            </a:schemeClr>
+          </a:lnRef>
+          <a:fillRef idx="1">
+            <a:schemeClr val="accent1"/>
+          </a:fillRef>
+          <a:effectRef idx="0">
+            <a:schemeClr val="accent1"/>
+          </a:effectRef>
+          <a:fontRef idx="minor">
+            <a:schemeClr val="lt1"/>
+          </a:fontRef>
+        </p:style>
+        <p:txBody>
+          <a:bodyPr rot="0" spcFirstLastPara="0" vertOverflow="overflow" horzOverflow="overflow" vert="horz" wrap="square" lIns="91440" tIns="45720" rIns="91440" bIns="45720" numCol="1" spcCol="0" rtlCol="0" fromWordArt="0" anchor="ctr" anchorCtr="0" forceAA="0" compatLnSpc="1">
+            <a:prstTxWarp prst="textNoShape">
+              <a:avLst/>
+            </a:prstTxWarp>
+            <a:noAutofit/>
+          </a:bodyPr>
+          <a:lstStyle/>
+          <a:p>
+            <a:pPr algn="ctr"/>
+            <a:r>
+              <a:rPr lang="bg-BG" sz="2800" b="1" dirty="0" smtClean="0">
+                <a:solidFill>
+                  <a:schemeClr val="tx1"/>
+                </a:solidFill>
+                <a:effectLst>
+                  <a:outerShdw blurRad="38100" dist="38100" dir="2700000" algn="tl">
+                    <a:schemeClr val="bg1">
+                      <a:alpha val="43000"/>
+                    </a:schemeClr>
+                  </a:outerShdw>
+                </a:effectLst>
+              </a:rPr>
+              <a:t>Кула</a:t>
+            </a:r>
+            <a:endParaRPr lang="bg-BG" sz="2800" b="1" dirty="0">
+              <a:solidFill>
+                <a:schemeClr val="tx1"/>
+              </a:solidFill>
+              <a:effectLst>
+                <a:outerShdw blurRad="38100" dist="38100" dir="2700000" algn="tl">
+                  <a:schemeClr val="bg1">
+                    <a:alpha val="43000"/>
+                  </a:schemeClr>
+                </a:outerShdw>
+              </a:effectLst>
+            </a:endParaRPr>
+          </a:p>
+        </p:txBody>
+      </p:sp>
+    </p:spTree>
+    <p:extLst>
+      <p:ext uri="{BB962C8B-B14F-4D97-AF65-F5344CB8AC3E}">
+        <p14:creationId xmlns:p14="http://schemas.microsoft.com/office/powerpoint/2010/main" val="3624535173"/>
+      </p:ext>
+    </p:extLst>
+  </p:cSld>
+  <p:clrMapOvr>
+    <a:masterClrMapping/>
+  </p:clrMapOvr>
+  <p:timing>
+    <p:tnLst>
+      <p:par>
+        <p:cTn id="1" dur="indefinite" restart="never" nodeType="tmRoot">
+          <p:childTnLst>
+            <p:seq concurrent="1" nextAc="seek">
+              <p:cTn id="2" dur="indefinite" nodeType="mainSeq">
+                <p:childTnLst>
+                  <p:par>
+                    <p:cTn id="3" fill="hold">
+                      <p:stCondLst>
+                        <p:cond delay="indefinite"/>
+                      </p:stCondLst>
+                      <p:childTnLst>
+                        <p:par>
+                          <p:cTn id="4" fill="hold">
+                            <p:stCondLst>
+                              <p:cond delay="0"/>
+                            </p:stCondLst>
+                            <p:childTnLst>
+                              <p:par>
+                                <p:cTn id="5" presetID="1" presetClass="entr" presetSubtype="0" fill="hold" grpId="0" nodeType="clickEffect">
+                                  <p:stCondLst>
+                                    <p:cond delay="0"/>
+                                  </p:stCondLst>
+                                  <p:childTnLst>
+                                    <p:set>
+                                      <p:cBhvr>
+                                        <p:cTn id="6" dur="1" fill="hold">
+                                          <p:stCondLst>
+                                            <p:cond delay="0"/>
+                                          </p:stCondLst>
+                                        </p:cTn>
+                                        <p:tgtEl>
+                                          <p:spTgt spid="8"/>
+                                        </p:tgtEl>
+                                        <p:attrNameLst>
+                                          <p:attrName>style.visibility</p:attrName>
+                                        </p:attrNameLst>
+                                      </p:cBhvr>
+                                      <p:to>
+                                        <p:strVal val="visible"/>
+                                      </p:to>
+                                    </p:set>
+                                  </p:childTnLst>
+                                </p:cTn>
+                              </p:par>
+                            </p:childTnLst>
+                          </p:cTn>
+                        </p:par>
+                      </p:childTnLst>
+                    </p:cTn>
+                  </p:par>
+                  <p:par>
+                    <p:cTn id="7" fill="hold">
+                      <p:stCondLst>
+                        <p:cond delay="indefinite"/>
+                      </p:stCondLst>
+                      <p:childTnLst>
+                        <p:par>
+                          <p:cTn id="8" fill="hold">
+                            <p:stCondLst>
+                              <p:cond delay="0"/>
+                            </p:stCondLst>
+                            <p:childTnLst>
+                              <p:par>
+                                <p:cTn id="9" presetID="1" presetClass="entr" presetSubtype="0" fill="hold" grpId="0" nodeType="clickEffect">
+                                  <p:stCondLst>
+                                    <p:cond delay="0"/>
+                                  </p:stCondLst>
+                                  <p:childTnLst>
+                                    <p:set>
+                                      <p:cBhvr>
+                                        <p:cTn id="10" dur="1" fill="hold">
+                                          <p:stCondLst>
+                                            <p:cond delay="0"/>
+                                          </p:stCondLst>
+                                        </p:cTn>
+                                        <p:tgtEl>
+                                          <p:spTgt spid="9"/>
+                                        </p:tgtEl>
+                                        <p:attrNameLst>
+                                          <p:attrName>style.visibility</p:attrName>
+                                        </p:attrNameLst>
+                                      </p:cBhvr>
+                                      <p:to>
+                                        <p:strVal val="visible"/>
+                                      </p:to>
+                                    </p:set>
+                                  </p:childTnLst>
+                                </p:cTn>
+                              </p:par>
+                            </p:childTnLst>
+                          </p:cTn>
+                        </p:par>
+                      </p:childTnLst>
+                    </p:cTn>
+                  </p:par>
+                  <p:par>
+                    <p:cTn id="11" fill="hold">
+                      <p:stCondLst>
+                        <p:cond delay="indefinite"/>
+                      </p:stCondLst>
+                      <p:childTnLst>
+                        <p:par>
+                          <p:cTn id="12" fill="hold">
+                            <p:stCondLst>
+                              <p:cond delay="0"/>
+                            </p:stCondLst>
+                            <p:childTnLst>
+                              <p:par>
+                                <p:cTn id="13" presetID="1" presetClass="entr" presetSubtype="0" fill="hold" grpId="0" nodeType="clickEffect">
+                                  <p:stCondLst>
+                                    <p:cond delay="0"/>
+                                  </p:stCondLst>
+                                  <p:childTnLst>
+                                    <p:set>
+                                      <p:cBhvr>
+                                        <p:cTn id="14" dur="1" fill="hold">
+                                          <p:stCondLst>
+                                            <p:cond delay="0"/>
+                                          </p:stCondLst>
+                                        </p:cTn>
+                                        <p:tgtEl>
+                                          <p:spTgt spid="10"/>
+                                        </p:tgtEl>
+                                        <p:attrNameLst>
+                                          <p:attrName>style.visibility</p:attrName>
+                                        </p:attrNameLst>
+                                      </p:cBhvr>
+                                      <p:to>
+                                        <p:strVal val="visible"/>
+                                      </p:to>
+                                    </p:set>
+                                  </p:childTnLst>
+                                </p:cTn>
+                              </p:par>
+                            </p:childTnLst>
+                          </p:cTn>
+                        </p:par>
+                      </p:childTnLst>
+                    </p:cTn>
+                  </p:par>
+                  <p:par>
+                    <p:cTn id="15" fill="hold">
+                      <p:stCondLst>
+                        <p:cond delay="indefinite"/>
+                      </p:stCondLst>
+                      <p:childTnLst>
+                        <p:par>
+                          <p:cTn id="16" fill="hold">
+                            <p:stCondLst>
+                              <p:cond delay="0"/>
+                            </p:stCondLst>
+                            <p:childTnLst>
+                              <p:par>
+                                <p:cTn id="17" presetID="1" presetClass="entr" presetSubtype="0" fill="hold" grpId="0" nodeType="clickEffect">
+                                  <p:stCondLst>
+                                    <p:cond delay="0"/>
+                                  </p:stCondLst>
+                                  <p:childTnLst>
+                                    <p:set>
+                                      <p:cBhvr>
+                                        <p:cTn id="18" dur="1" fill="hold">
+                                          <p:stCondLst>
+                                            <p:cond delay="0"/>
+                                          </p:stCondLst>
+                                        </p:cTn>
+                                        <p:tgtEl>
+                                          <p:spTgt spid="11"/>
+                                        </p:tgtEl>
+                                        <p:attrNameLst>
+                                          <p:attrName>style.visibility</p:attrName>
+                                        </p:attrNameLst>
+                                      </p:cBhvr>
+                                      <p:to>
+                                        <p:strVal val="visible"/>
+                                      </p:to>
+                                    </p:set>
+                                  </p:childTnLst>
+                                </p:cTn>
+                              </p:par>
+                            </p:childTnLst>
+                          </p:cTn>
+                        </p:par>
+                      </p:childTnLst>
+                    </p:cTn>
+                  </p:par>
+                </p:childTnLst>
+              </p:cTn>
+              <p:prevCondLst>
+                <p:cond evt="onPrev" delay="0">
+                  <p:tgtEl>
+                    <p:sldTgt/>
+                  </p:tgtEl>
+                </p:cond>
+              </p:prevCondLst>
+              <p:nextCondLst>
+                <p:cond evt="onNext" delay="0">
+                  <p:tgtEl>
+                    <p:sldTgt/>
+                  </p:tgtEl>
+                </p:cond>
+              </p:nextCondLst>
+            </p:seq>
+          </p:childTnLst>
+        </p:cTn>
+      </p:par>
+    </p:tnLst>
+    <p:bldLst>
+      <p:bldP spid="8" grpId="0" animBg="1"/>
+      <p:bldP spid="9" grpId="0" animBg="1"/>
+      <p:bldP spid="10" grpId="0" animBg="1"/>
+      <p:bldP spid="11" grpId="0" animBg="1"/>
+    </p:bldLst>
+  </p:timing>
+</p:sld>
+</file>
+
+<file path=ppt/slides/slide6.xml><?xml version="1.0" encoding="utf-8"?>
+<p:sld xmlns:a="http://schemas.openxmlformats.org/drawingml/2006/main" xmlns:r="http://schemas.openxmlformats.org/officeDocument/2006/relationships" xmlns:p="http://schemas.openxmlformats.org/presentationml/2006/main">
+  <p:cSld>
+    <p:spTree>
+      <p:nvGrpSpPr>
+        <p:cNvPr id="1" name=""/>
+        <p:cNvGrpSpPr/>
+        <p:nvPr/>
+      </p:nvGrpSpPr>
+      <p:grpSpPr>
+        <a:xfrm>
+          <a:off x="0" y="0"/>
+          <a:ext cx="0" cy="0"/>
+          <a:chOff x="0" y="0"/>
+          <a:chExt cx="0" cy="0"/>
+        </a:xfrm>
+      </p:grpSpPr>
+      <p:pic>
+        <p:nvPicPr>
+          <p:cNvPr id="2" name="Picture 1"/>
+          <p:cNvPicPr>
+            <a:picLocks noChangeAspect="1"/>
+          </p:cNvPicPr>
+          <p:nvPr/>
+        </p:nvPicPr>
+        <p:blipFill>
+          <a:blip r:embed="rId2"/>
+          <a:stretch>
+            <a:fillRect/>
+          </a:stretch>
+        </p:blipFill>
+        <p:spPr>
+          <a:xfrm>
+            <a:off x="4010235" y="2717480"/>
+            <a:ext cx="2677903" cy="689520"/>
+          </a:xfrm>
+          <a:prstGeom prst="rect">
+            <a:avLst/>
+          </a:prstGeom>
+        </p:spPr>
+      </p:pic>
+      <p:sp>
+        <p:nvSpPr>
+          <p:cNvPr id="6" name="AutoShape 5"/>
+          <p:cNvSpPr>
+            <a:spLocks noChangeArrowheads="1"/>
+          </p:cNvSpPr>
+          <p:nvPr/>
+        </p:nvSpPr>
+        <p:spPr bwMode="auto">
+          <a:xfrm>
+            <a:off x="3733800" y="1949833"/>
+            <a:ext cx="866986" cy="546264"/>
+          </a:xfrm>
+          <a:prstGeom prst="wedgeRoundRectCallout">
+            <a:avLst>
+              <a:gd name="adj1" fmla="val 20462"/>
+              <a:gd name="adj2" fmla="val 31163"/>
+              <a:gd name="adj3" fmla="val 16667"/>
+            </a:avLst>
+          </a:prstGeom>
+          <a:solidFill>
+            <a:schemeClr val="bg1">
+              <a:lumMod val="85000"/>
+              <a:alpha val="94902"/>
+            </a:schemeClr>
+          </a:solidFill>
+          <a:ln w="19050">
+            <a:solidFill>
+              <a:schemeClr val="bg1">
+                <a:lumMod val="50000"/>
+                <a:alpha val="80000"/>
+              </a:schemeClr>
+            </a:solidFill>
+          </a:ln>
+        </p:spPr>
+        <p:style>
+          <a:lnRef idx="2">
+            <a:schemeClr val="accent1">
+              <a:shade val="50000"/>
+            </a:schemeClr>
+          </a:lnRef>
+          <a:fillRef idx="1">
+            <a:schemeClr val="accent1"/>
+          </a:fillRef>
+          <a:effectRef idx="0">
+            <a:schemeClr val="accent1"/>
+          </a:effectRef>
+          <a:fontRef idx="minor">
+            <a:schemeClr val="lt1"/>
+          </a:fontRef>
+        </p:style>
+        <p:txBody>
+          <a:bodyPr rot="0" spcFirstLastPara="0" vertOverflow="overflow" horzOverflow="overflow" vert="horz" wrap="square" lIns="91440" tIns="45720" rIns="91440" bIns="45720" numCol="1" spcCol="0" rtlCol="0" fromWordArt="0" anchor="ctr" anchorCtr="0" forceAA="0" compatLnSpc="1">
+            <a:prstTxWarp prst="textNoShape">
+              <a:avLst/>
+            </a:prstTxWarp>
+            <a:noAutofit/>
+          </a:bodyPr>
+          <a:lstStyle/>
+          <a:p>
+            <a:pPr algn="ctr"/>
+            <a:r>
+              <a:rPr lang="en-US" sz="2800" b="1" dirty="0" smtClean="0">
+                <a:solidFill>
+                  <a:schemeClr val="tx1"/>
+                </a:solidFill>
+                <a:effectLst>
+                  <a:outerShdw blurRad="38100" dist="38100" dir="2700000" algn="tl">
+                    <a:schemeClr val="bg1">
+                      <a:alpha val="43000"/>
+                    </a:schemeClr>
+                  </a:outerShdw>
+                </a:effectLst>
+              </a:rPr>
+              <a:t>n=</a:t>
+            </a:r>
+            <a:r>
+              <a:rPr lang="bg-BG" sz="2800" b="1" dirty="0" smtClean="0">
+                <a:solidFill>
+                  <a:schemeClr val="tx1"/>
+                </a:solidFill>
+                <a:effectLst>
+                  <a:outerShdw blurRad="38100" dist="38100" dir="2700000" algn="tl">
+                    <a:schemeClr val="bg1">
+                      <a:alpha val="43000"/>
+                    </a:schemeClr>
+                  </a:outerShdw>
+                </a:effectLst>
+              </a:rPr>
+              <a:t>4</a:t>
+            </a:r>
+            <a:endParaRPr lang="bg-BG" sz="2800" b="1" dirty="0">
+              <a:solidFill>
+                <a:schemeClr val="tx1"/>
+              </a:solidFill>
+              <a:effectLst>
+                <a:outerShdw blurRad="38100" dist="38100" dir="2700000" algn="tl">
+                  <a:schemeClr val="bg1">
+                    <a:alpha val="43000"/>
+                  </a:schemeClr>
+                </a:outerShdw>
+              </a:effectLst>
+            </a:endParaRPr>
+          </a:p>
+        </p:txBody>
+      </p:sp>
+    </p:spTree>
+    <p:extLst>
+      <p:ext uri="{BB962C8B-B14F-4D97-AF65-F5344CB8AC3E}">
+        <p14:creationId xmlns:p14="http://schemas.microsoft.com/office/powerpoint/2010/main" val="3126789325"/>
+      </p:ext>
+    </p:extLst>
+  </p:cSld>
+  <p:clrMapOvr>
+    <a:masterClrMapping/>
+  </p:clrMapOvr>
+  <p:timing>
+    <p:tnLst>
+      <p:par>
+        <p:cTn id="1" dur="indefinite" restart="never" nodeType="tmRoot">
+          <p:childTnLst>
+            <p:seq concurrent="1" nextAc="seek">
+              <p:cTn id="2" dur="indefinite" nodeType="mainSeq">
+                <p:childTnLst>
+                  <p:par>
+                    <p:cTn id="3" fill="hold">
+                      <p:stCondLst>
+                        <p:cond delay="indefinite"/>
+                      </p:stCondLst>
+                      <p:childTnLst>
+                        <p:par>
+                          <p:cTn id="4" fill="hold">
+                            <p:stCondLst>
+                              <p:cond delay="0"/>
+                            </p:stCondLst>
+                            <p:childTnLst>
+                              <p:par>
+                                <p:cTn id="5" presetID="1" presetClass="entr" presetSubtype="0" fill="hold" grpId="0" nodeType="clickEffect">
+                                  <p:stCondLst>
+                                    <p:cond delay="0"/>
+                                  </p:stCondLst>
+                                  <p:childTnLst>
+                                    <p:set>
+                                      <p:cBhvr>
+                                        <p:cTn id="6" dur="1" fill="hold">
+                                          <p:stCondLst>
+                                            <p:cond delay="0"/>
+                                          </p:stCondLst>
+                                        </p:cTn>
+                                        <p:tgtEl>
+                                          <p:spTgt spid="6"/>
+                                        </p:tgtEl>
+                                        <p:attrNameLst>
+                                          <p:attrName>style.visibility</p:attrName>
+                                        </p:attrNameLst>
+                                      </p:cBhvr>
+                                      <p:to>
+                                        <p:strVal val="visible"/>
+                                      </p:to>
+                                    </p:set>
+                                  </p:childTnLst>
+                                </p:cTn>
+                              </p:par>
+                            </p:childTnLst>
+                          </p:cTn>
+                        </p:par>
+                      </p:childTnLst>
+                    </p:cTn>
+                  </p:par>
+                </p:childTnLst>
+              </p:cTn>
+              <p:prevCondLst>
+                <p:cond evt="onPrev" delay="0">
+                  <p:tgtEl>
+                    <p:sldTgt/>
+                  </p:tgtEl>
+                </p:cond>
+              </p:prevCondLst>
+              <p:nextCondLst>
+                <p:cond evt="onNext" delay="0">
+                  <p:tgtEl>
+                    <p:sldTgt/>
+                  </p:tgtEl>
+                </p:cond>
+              </p:nextCondLst>
+            </p:seq>
+          </p:childTnLst>
+        </p:cTn>
+      </p:par>
+    </p:tnLst>
+    <p:bldLst>
+      <p:bldP spid="6" grpId="0" animBg="1"/>
+    </p:bldLst>
+  </p:timing>
+</p:sld>
+</file>
+
+<file path=ppt/slides/slide7.xml><?xml version="1.0" encoding="utf-8"?>
+<p:sld xmlns:a="http://schemas.openxmlformats.org/drawingml/2006/main" xmlns:r="http://schemas.openxmlformats.org/officeDocument/2006/relationships" xmlns:p="http://schemas.openxmlformats.org/presentationml/2006/main">
+  <p:cSld>
+    <p:spTree>
+      <p:nvGrpSpPr>
+        <p:cNvPr id="1" name=""/>
+        <p:cNvGrpSpPr/>
+        <p:nvPr/>
+      </p:nvGrpSpPr>
+      <p:grpSpPr>
+        <a:xfrm>
+          <a:off x="0" y="0"/>
+          <a:ext cx="0" cy="0"/>
+          <a:chOff x="0" y="0"/>
+          <a:chExt cx="0" cy="0"/>
+        </a:xfrm>
+      </p:grpSpPr>
+      <p:pic>
+        <p:nvPicPr>
+          <p:cNvPr id="7" name="Picture 6"/>
+          <p:cNvPicPr>
+            <a:picLocks noChangeAspect="1"/>
+          </p:cNvPicPr>
+          <p:nvPr/>
+        </p:nvPicPr>
+        <p:blipFill>
+          <a:blip r:embed="rId2"/>
+          <a:stretch>
+            <a:fillRect/>
+          </a:stretch>
+        </p:blipFill>
+        <p:spPr>
+          <a:xfrm>
+            <a:off x="3723165" y="2637044"/>
+            <a:ext cx="3673424" cy="846411"/>
+          </a:xfrm>
+          <a:prstGeom prst="rect">
+            <a:avLst/>
+          </a:prstGeom>
+        </p:spPr>
+      </p:pic>
+      <p:sp>
+        <p:nvSpPr>
+          <p:cNvPr id="3" name="AutoShape 5"/>
+          <p:cNvSpPr>
+            <a:spLocks noChangeArrowheads="1"/>
+          </p:cNvSpPr>
+          <p:nvPr/>
+        </p:nvSpPr>
+        <p:spPr bwMode="auto">
+          <a:xfrm>
+            <a:off x="3289672" y="1769044"/>
+            <a:ext cx="866986" cy="546264"/>
+          </a:xfrm>
+          <a:prstGeom prst="wedgeRoundRectCallout">
+            <a:avLst>
+              <a:gd name="adj1" fmla="val 20462"/>
+              <a:gd name="adj2" fmla="val 31163"/>
+              <a:gd name="adj3" fmla="val 16667"/>
+            </a:avLst>
+          </a:prstGeom>
+          <a:solidFill>
+            <a:schemeClr val="bg1">
+              <a:lumMod val="85000"/>
+              <a:alpha val="94902"/>
+            </a:schemeClr>
+          </a:solidFill>
+          <a:ln w="19050">
+            <a:solidFill>
+              <a:schemeClr val="bg1">
+                <a:lumMod val="50000"/>
+                <a:alpha val="80000"/>
+              </a:schemeClr>
+            </a:solidFill>
+          </a:ln>
+        </p:spPr>
+        <p:style>
+          <a:lnRef idx="2">
+            <a:schemeClr val="accent1">
+              <a:shade val="50000"/>
+            </a:schemeClr>
+          </a:lnRef>
+          <a:fillRef idx="1">
+            <a:schemeClr val="accent1"/>
+          </a:fillRef>
+          <a:effectRef idx="0">
+            <a:schemeClr val="accent1"/>
+          </a:effectRef>
+          <a:fontRef idx="minor">
+            <a:schemeClr val="lt1"/>
+          </a:fontRef>
+        </p:style>
+        <p:txBody>
+          <a:bodyPr rot="0" spcFirstLastPara="0" vertOverflow="overflow" horzOverflow="overflow" vert="horz" wrap="square" lIns="91440" tIns="45720" rIns="91440" bIns="45720" numCol="1" spcCol="0" rtlCol="0" fromWordArt="0" anchor="ctr" anchorCtr="0" forceAA="0" compatLnSpc="1">
+            <a:prstTxWarp prst="textNoShape">
+              <a:avLst/>
+            </a:prstTxWarp>
+            <a:noAutofit/>
+          </a:bodyPr>
+          <a:lstStyle/>
+          <a:p>
+            <a:pPr algn="ctr"/>
+            <a:r>
+              <a:rPr lang="en-US" sz="2800" b="1" dirty="0" smtClean="0">
+                <a:solidFill>
+                  <a:schemeClr val="tx1"/>
+                </a:solidFill>
+                <a:effectLst>
+                  <a:outerShdw blurRad="38100" dist="38100" dir="2700000" algn="tl">
+                    <a:schemeClr val="bg1">
+                      <a:alpha val="43000"/>
+                    </a:schemeClr>
+                  </a:outerShdw>
+                </a:effectLst>
+              </a:rPr>
+              <a:t>n=</a:t>
+            </a:r>
+            <a:r>
+              <a:rPr lang="bg-BG" sz="2800" b="1" dirty="0" smtClean="0">
+                <a:solidFill>
+                  <a:schemeClr val="tx1"/>
+                </a:solidFill>
+                <a:effectLst>
+                  <a:outerShdw blurRad="38100" dist="38100" dir="2700000" algn="tl">
+                    <a:schemeClr val="bg1">
+                      <a:alpha val="43000"/>
+                    </a:schemeClr>
+                  </a:outerShdw>
+                </a:effectLst>
+              </a:rPr>
+              <a:t>5</a:t>
+            </a:r>
+            <a:endParaRPr lang="bg-BG" sz="2800" b="1" dirty="0">
+              <a:solidFill>
+                <a:schemeClr val="tx1"/>
+              </a:solidFill>
+              <a:effectLst>
+                <a:outerShdw blurRad="38100" dist="38100" dir="2700000" algn="tl">
+                  <a:schemeClr val="bg1">
+                    <a:alpha val="43000"/>
+                  </a:schemeClr>
+                </a:outerShdw>
+              </a:effectLst>
+            </a:endParaRPr>
+          </a:p>
+        </p:txBody>
+      </p:sp>
+      <p:sp>
+        <p:nvSpPr>
+          <p:cNvPr id="4" name="AutoShape 6"/>
+          <p:cNvSpPr>
+            <a:spLocks noChangeArrowheads="1"/>
+          </p:cNvSpPr>
+          <p:nvPr/>
+        </p:nvSpPr>
+        <p:spPr bwMode="auto">
+          <a:xfrm>
+            <a:off x="5366228" y="3677870"/>
+            <a:ext cx="3180872" cy="657899"/>
+          </a:xfrm>
+          <a:prstGeom prst="wedgeRoundRectCallout">
+            <a:avLst>
+              <a:gd name="adj1" fmla="val -43463"/>
+              <a:gd name="adj2" fmla="val -98707"/>
+              <a:gd name="adj3" fmla="val 16667"/>
+            </a:avLst>
+          </a:prstGeom>
+          <a:solidFill>
+            <a:schemeClr val="bg1">
+              <a:lumMod val="85000"/>
+              <a:alpha val="94902"/>
+            </a:schemeClr>
+          </a:solidFill>
+          <a:ln w="19050">
+            <a:solidFill>
+              <a:schemeClr val="bg1">
+                <a:lumMod val="50000"/>
+                <a:alpha val="80000"/>
+              </a:schemeClr>
+            </a:solidFill>
+          </a:ln>
+        </p:spPr>
+        <p:style>
+          <a:lnRef idx="2">
+            <a:schemeClr val="accent1">
+              <a:shade val="50000"/>
+            </a:schemeClr>
+          </a:lnRef>
+          <a:fillRef idx="1">
+            <a:schemeClr val="accent1"/>
+          </a:fillRef>
+          <a:effectRef idx="0">
+            <a:schemeClr val="accent1"/>
+          </a:effectRef>
+          <a:fontRef idx="minor">
+            <a:schemeClr val="lt1"/>
+          </a:fontRef>
+        </p:style>
+        <p:txBody>
+          <a:bodyPr rot="0" spcFirstLastPara="0" vertOverflow="overflow" horzOverflow="overflow" vert="horz" wrap="square" lIns="91440" tIns="45720" rIns="91440" bIns="45720" numCol="1" spcCol="0" rtlCol="0" fromWordArt="0" anchor="ctr" anchorCtr="0" forceAA="0" compatLnSpc="1">
+            <a:prstTxWarp prst="textNoShape">
+              <a:avLst/>
+            </a:prstTxWarp>
+            <a:noAutofit/>
+          </a:bodyPr>
+          <a:lstStyle/>
+          <a:p>
+            <a:pPr algn="ctr"/>
+            <a:r>
+              <a:rPr lang="bg-BG" sz="2800" b="1" dirty="0" smtClean="0">
+                <a:solidFill>
+                  <a:schemeClr val="tx1"/>
+                </a:solidFill>
+                <a:effectLst>
+                  <a:outerShdw blurRad="38100" dist="38100" dir="2700000" algn="tl">
+                    <a:schemeClr val="bg1">
+                      <a:alpha val="43000"/>
+                    </a:schemeClr>
+                  </a:outerShdw>
+                </a:effectLst>
+              </a:rPr>
+              <a:t>Междинен покрив</a:t>
+            </a:r>
+            <a:endParaRPr lang="bg-BG" sz="2800" b="1" dirty="0">
+              <a:solidFill>
+                <a:schemeClr val="tx1"/>
+              </a:solidFill>
+              <a:effectLst>
+                <a:outerShdw blurRad="38100" dist="38100" dir="2700000" algn="tl">
+                  <a:schemeClr val="bg1">
+                    <a:alpha val="43000"/>
+                  </a:schemeClr>
+                </a:outerShdw>
+              </a:effectLst>
+            </a:endParaRPr>
+          </a:p>
+        </p:txBody>
+      </p:sp>
+      <p:sp>
+        <p:nvSpPr>
+          <p:cNvPr id="5" name="AutoShape 6"/>
+          <p:cNvSpPr>
+            <a:spLocks noChangeArrowheads="1"/>
+          </p:cNvSpPr>
+          <p:nvPr/>
+        </p:nvSpPr>
+        <p:spPr bwMode="auto">
+          <a:xfrm>
+            <a:off x="4458656" y="1886331"/>
+            <a:ext cx="1352072" cy="657899"/>
+          </a:xfrm>
+          <a:prstGeom prst="wedgeRoundRectCallout">
+            <a:avLst>
+              <a:gd name="adj1" fmla="val -42664"/>
+              <a:gd name="adj2" fmla="val 82749"/>
+              <a:gd name="adj3" fmla="val 16667"/>
+            </a:avLst>
+          </a:prstGeom>
+          <a:solidFill>
+            <a:schemeClr val="bg1">
+              <a:lumMod val="85000"/>
+              <a:alpha val="94902"/>
+            </a:schemeClr>
+          </a:solidFill>
+          <a:ln w="19050">
+            <a:solidFill>
+              <a:schemeClr val="bg1">
+                <a:lumMod val="50000"/>
+                <a:alpha val="80000"/>
+              </a:schemeClr>
+            </a:solidFill>
+          </a:ln>
+        </p:spPr>
+        <p:style>
+          <a:lnRef idx="2">
+            <a:schemeClr val="accent1">
+              <a:shade val="50000"/>
+            </a:schemeClr>
+          </a:lnRef>
+          <a:fillRef idx="1">
+            <a:schemeClr val="accent1"/>
+          </a:fillRef>
+          <a:effectRef idx="0">
+            <a:schemeClr val="accent1"/>
+          </a:effectRef>
+          <a:fontRef idx="minor">
+            <a:schemeClr val="lt1"/>
+          </a:fontRef>
+        </p:style>
+        <p:txBody>
+          <a:bodyPr rot="0" spcFirstLastPara="0" vertOverflow="overflow" horzOverflow="overflow" vert="horz" wrap="square" lIns="91440" tIns="45720" rIns="91440" bIns="45720" numCol="1" spcCol="0" rtlCol="0" fromWordArt="0" anchor="ctr" anchorCtr="0" forceAA="0" compatLnSpc="1">
+            <a:prstTxWarp prst="textNoShape">
+              <a:avLst/>
+            </a:prstTxWarp>
+            <a:noAutofit/>
+          </a:bodyPr>
+          <a:lstStyle/>
+          <a:p>
+            <a:pPr algn="ctr"/>
+            <a:r>
+              <a:rPr lang="bg-BG" sz="2800" b="1" dirty="0" smtClean="0">
+                <a:solidFill>
+                  <a:schemeClr val="tx1"/>
+                </a:solidFill>
+                <a:effectLst>
+                  <a:outerShdw blurRad="38100" dist="38100" dir="2700000" algn="tl">
+                    <a:schemeClr val="bg1">
+                      <a:alpha val="43000"/>
+                    </a:schemeClr>
+                  </a:outerShdw>
+                </a:effectLst>
+              </a:rPr>
+              <a:t>Кула</a:t>
+            </a:r>
+            <a:endParaRPr lang="bg-BG" sz="2800" b="1" dirty="0">
+              <a:solidFill>
+                <a:schemeClr val="tx1"/>
+              </a:solidFill>
+              <a:effectLst>
+                <a:outerShdw blurRad="38100" dist="38100" dir="2700000" algn="tl">
+                  <a:schemeClr val="bg1">
+                    <a:alpha val="43000"/>
+                  </a:schemeClr>
+                </a:outerShdw>
+              </a:effectLst>
+            </a:endParaRPr>
+          </a:p>
+        </p:txBody>
+      </p:sp>
+      <p:sp>
+        <p:nvSpPr>
+          <p:cNvPr id="6" name="AutoShape 6"/>
+          <p:cNvSpPr>
+            <a:spLocks noChangeArrowheads="1"/>
+          </p:cNvSpPr>
+          <p:nvPr/>
+        </p:nvSpPr>
+        <p:spPr bwMode="auto">
+          <a:xfrm>
+            <a:off x="6372464" y="1881937"/>
+            <a:ext cx="1352072" cy="657899"/>
+          </a:xfrm>
+          <a:prstGeom prst="wedgeRoundRectCallout">
+            <a:avLst>
+              <a:gd name="adj1" fmla="val -42664"/>
+              <a:gd name="adj2" fmla="val 82749"/>
+              <a:gd name="adj3" fmla="val 16667"/>
+            </a:avLst>
+          </a:prstGeom>
+          <a:solidFill>
+            <a:schemeClr val="bg1">
+              <a:lumMod val="85000"/>
+              <a:alpha val="94902"/>
+            </a:schemeClr>
+          </a:solidFill>
+          <a:ln w="19050">
+            <a:solidFill>
+              <a:schemeClr val="bg1">
+                <a:lumMod val="50000"/>
+                <a:alpha val="80000"/>
+              </a:schemeClr>
+            </a:solidFill>
+          </a:ln>
+        </p:spPr>
+        <p:style>
+          <a:lnRef idx="2">
+            <a:schemeClr val="accent1">
+              <a:shade val="50000"/>
+            </a:schemeClr>
+          </a:lnRef>
+          <a:fillRef idx="1">
+            <a:schemeClr val="accent1"/>
+          </a:fillRef>
+          <a:effectRef idx="0">
+            <a:schemeClr val="accent1"/>
+          </a:effectRef>
+          <a:fontRef idx="minor">
+            <a:schemeClr val="lt1"/>
+          </a:fontRef>
+        </p:style>
+        <p:txBody>
+          <a:bodyPr rot="0" spcFirstLastPara="0" vertOverflow="overflow" horzOverflow="overflow" vert="horz" wrap="square" lIns="91440" tIns="45720" rIns="91440" bIns="45720" numCol="1" spcCol="0" rtlCol="0" fromWordArt="0" anchor="ctr" anchorCtr="0" forceAA="0" compatLnSpc="1">
+            <a:prstTxWarp prst="textNoShape">
+              <a:avLst/>
+            </a:prstTxWarp>
+            <a:noAutofit/>
+          </a:bodyPr>
+          <a:lstStyle/>
+          <a:p>
+            <a:pPr algn="ctr"/>
+            <a:r>
+              <a:rPr lang="bg-BG" sz="2800" b="1" dirty="0" smtClean="0">
+                <a:solidFill>
+                  <a:schemeClr val="tx1"/>
+                </a:solidFill>
+                <a:effectLst>
+                  <a:outerShdw blurRad="38100" dist="38100" dir="2700000" algn="tl">
+                    <a:schemeClr val="bg1">
+                      <a:alpha val="43000"/>
+                    </a:schemeClr>
+                  </a:outerShdw>
+                </a:effectLst>
+              </a:rPr>
+              <a:t>Кула</a:t>
+            </a:r>
+            <a:endParaRPr lang="bg-BG" sz="2800" b="1" dirty="0">
+              <a:solidFill>
+                <a:schemeClr val="tx1"/>
+              </a:solidFill>
+              <a:effectLst>
+                <a:outerShdw blurRad="38100" dist="38100" dir="2700000" algn="tl">
+                  <a:schemeClr val="bg1">
+                    <a:alpha val="43000"/>
+                  </a:schemeClr>
+                </a:outerShdw>
+              </a:effectLst>
+            </a:endParaRPr>
+          </a:p>
+        </p:txBody>
+      </p:sp>
+    </p:spTree>
+    <p:extLst>
+      <p:ext uri="{BB962C8B-B14F-4D97-AF65-F5344CB8AC3E}">
+        <p14:creationId xmlns:p14="http://schemas.microsoft.com/office/powerpoint/2010/main" val="2053153620"/>
+      </p:ext>
+    </p:extLst>
+  </p:cSld>
+  <p:clrMapOvr>
+    <a:masterClrMapping/>
+  </p:clrMapOvr>
+  <p:timing>
+    <p:tnLst>
+      <p:par>
+        <p:cTn id="1" dur="indefinite" restart="never" nodeType="tmRoot">
+          <p:childTnLst>
+            <p:seq concurrent="1" nextAc="seek">
+              <p:cTn id="2" dur="indefinite" nodeType="mainSeq">
+                <p:childTnLst>
+                  <p:par>
+                    <p:cTn id="3" fill="hold">
+                      <p:stCondLst>
+                        <p:cond delay="indefinite"/>
+                      </p:stCondLst>
+                      <p:childTnLst>
+                        <p:par>
+                          <p:cTn id="4" fill="hold">
+                            <p:stCondLst>
+                              <p:cond delay="0"/>
+                            </p:stCondLst>
+                            <p:childTnLst>
+                              <p:par>
+                                <p:cTn id="5" presetID="1" presetClass="entr" presetSubtype="0" fill="hold" grpId="0" nodeType="clickEffect">
+                                  <p:stCondLst>
+                                    <p:cond delay="0"/>
+                                  </p:stCondLst>
+                                  <p:childTnLst>
+                                    <p:set>
+                                      <p:cBhvr>
+                                        <p:cTn id="6" dur="1" fill="hold">
+                                          <p:stCondLst>
+                                            <p:cond delay="0"/>
+                                          </p:stCondLst>
+                                        </p:cTn>
+                                        <p:tgtEl>
+                                          <p:spTgt spid="3"/>
+                                        </p:tgtEl>
+                                        <p:attrNameLst>
+                                          <p:attrName>style.visibility</p:attrName>
+                                        </p:attrNameLst>
+                                      </p:cBhvr>
+                                      <p:to>
+                                        <p:strVal val="visible"/>
+                                      </p:to>
+                                    </p:set>
+                                  </p:childTnLst>
+                                </p:cTn>
+                              </p:par>
+                            </p:childTnLst>
+                          </p:cTn>
+                        </p:par>
+                      </p:childTnLst>
+                    </p:cTn>
+                  </p:par>
+                  <p:par>
+                    <p:cTn id="7" fill="hold">
+                      <p:stCondLst>
+                        <p:cond delay="indefinite"/>
+                      </p:stCondLst>
+                      <p:childTnLst>
+                        <p:par>
+                          <p:cTn id="8" fill="hold">
+                            <p:stCondLst>
+                              <p:cond delay="0"/>
+                            </p:stCondLst>
+                            <p:childTnLst>
+                              <p:par>
+                                <p:cTn id="9" presetID="1" presetClass="entr" presetSubtype="0" fill="hold" grpId="0" nodeType="clickEffect">
+                                  <p:stCondLst>
+                                    <p:cond delay="0"/>
+                                  </p:stCondLst>
+                                  <p:childTnLst>
+                                    <p:set>
+                                      <p:cBhvr>
+                                        <p:cTn id="10" dur="1" fill="hold">
+                                          <p:stCondLst>
+                                            <p:cond delay="0"/>
+                                          </p:stCondLst>
+                                        </p:cTn>
+                                        <p:tgtEl>
+                                          <p:spTgt spid="4"/>
+                                        </p:tgtEl>
+                                        <p:attrNameLst>
+                                          <p:attrName>style.visibility</p:attrName>
+                                        </p:attrNameLst>
+                                      </p:cBhvr>
+                                      <p:to>
+                                        <p:strVal val="visible"/>
+                                      </p:to>
+                                    </p:set>
+                                  </p:childTnLst>
+                                </p:cTn>
+                              </p:par>
+                            </p:childTnLst>
+                          </p:cTn>
+                        </p:par>
+                      </p:childTnLst>
+                    </p:cTn>
+                  </p:par>
+                  <p:par>
+                    <p:cTn id="11" fill="hold">
+                      <p:stCondLst>
+                        <p:cond delay="indefinite"/>
+                      </p:stCondLst>
+                      <p:childTnLst>
+                        <p:par>
+                          <p:cTn id="12" fill="hold">
+                            <p:stCondLst>
+                              <p:cond delay="0"/>
+                            </p:stCondLst>
+                            <p:childTnLst>
+                              <p:par>
+                                <p:cTn id="13" presetID="1" presetClass="entr" presetSubtype="0" fill="hold" grpId="0" nodeType="clickEffect">
+                                  <p:stCondLst>
+                                    <p:cond delay="0"/>
+                                  </p:stCondLst>
+                                  <p:childTnLst>
+                                    <p:set>
+                                      <p:cBhvr>
+                                        <p:cTn id="14" dur="1" fill="hold">
+                                          <p:stCondLst>
+                                            <p:cond delay="0"/>
+                                          </p:stCondLst>
+                                        </p:cTn>
+                                        <p:tgtEl>
+                                          <p:spTgt spid="5"/>
+                                        </p:tgtEl>
+                                        <p:attrNameLst>
+                                          <p:attrName>style.visibility</p:attrName>
+                                        </p:attrNameLst>
+                                      </p:cBhvr>
+                                      <p:to>
+                                        <p:strVal val="visible"/>
+                                      </p:to>
+                                    </p:set>
+                                  </p:childTnLst>
+                                </p:cTn>
+                              </p:par>
+                            </p:childTnLst>
+                          </p:cTn>
+                        </p:par>
+                      </p:childTnLst>
+                    </p:cTn>
+                  </p:par>
+                  <p:par>
+                    <p:cTn id="15" fill="hold">
+                      <p:stCondLst>
+                        <p:cond delay="indefinite"/>
+                      </p:stCondLst>
+                      <p:childTnLst>
+                        <p:par>
+                          <p:cTn id="16" fill="hold">
+                            <p:stCondLst>
+                              <p:cond delay="0"/>
+                            </p:stCondLst>
+                            <p:childTnLst>
+                              <p:par>
+                                <p:cTn id="17" presetID="1" presetClass="entr" presetSubtype="0" fill="hold" grpId="0" nodeType="clickEffect">
+                                  <p:stCondLst>
+                                    <p:cond delay="0"/>
+                                  </p:stCondLst>
+                                  <p:childTnLst>
+                                    <p:set>
+                                      <p:cBhvr>
+                                        <p:cTn id="18" dur="1" fill="hold">
+                                          <p:stCondLst>
+                                            <p:cond delay="0"/>
+                                          </p:stCondLst>
+                                        </p:cTn>
+                                        <p:tgtEl>
+                                          <p:spTgt spid="6"/>
+                                        </p:tgtEl>
+                                        <p:attrNameLst>
+                                          <p:attrName>style.visibility</p:attrName>
+                                        </p:attrNameLst>
+                                      </p:cBhvr>
+                                      <p:to>
+                                        <p:strVal val="visible"/>
+                                      </p:to>
+                                    </p:set>
+                                  </p:childTnLst>
+                                </p:cTn>
+                              </p:par>
+                            </p:childTnLst>
+                          </p:cTn>
+                        </p:par>
+                      </p:childTnLst>
+                    </p:cTn>
+                  </p:par>
+                </p:childTnLst>
+              </p:cTn>
+              <p:prevCondLst>
+                <p:cond evt="onPrev" delay="0">
+                  <p:tgtEl>
+                    <p:sldTgt/>
+                  </p:tgtEl>
+                </p:cond>
+              </p:prevCondLst>
+              <p:nextCondLst>
+                <p:cond evt="onNext" delay="0">
+                  <p:tgtEl>
+                    <p:sldTgt/>
+                  </p:tgtEl>
+                </p:cond>
+              </p:nextCondLst>
+            </p:seq>
+          </p:childTnLst>
+        </p:cTn>
+      </p:par>
+    </p:tnLst>
+    <p:bldLst>
+      <p:bldP spid="3" grpId="0" animBg="1"/>
+      <p:bldP spid="4" grpId="0" animBg="1"/>
+      <p:bldP spid="5" grpId="0" animBg="1"/>
+      <p:bldP spid="6" grpId="0" animBg="1"/>
     </p:bldLst>
   </p:timing>
 </p:sld>

</xml_diff>

<commit_message>
Add code to Fort Problem. Add butterfly Description
</commit_message>
<xml_diff>
--- a/assets/chapter-6-images/chapter-6-images.pptx
+++ b/assets/chapter-6-images/chapter-6-images.pptx
@@ -12,6 +12,10 @@
     <p:sldId id="261" r:id="rId6"/>
     <p:sldId id="262" r:id="rId7"/>
     <p:sldId id="263" r:id="rId8"/>
+    <p:sldId id="264" r:id="rId9"/>
+    <p:sldId id="265" r:id="rId10"/>
+    <p:sldId id="266" r:id="rId11"/>
+    <p:sldId id="267" r:id="rId12"/>
   </p:sldIdLst>
   <p:sldSz cx="12192000" cy="6858000"/>
   <p:notesSz cx="6858000" cy="9144000"/>
@@ -249,7 +253,7 @@
           <a:p>
             <a:fld id="{1C173AAD-17BE-4B70-87A9-E7BA74A6C5B5}" type="datetimeFigureOut">
               <a:rPr lang="bg-BG" smtClean="0"/>
-              <a:t>8.3.2017 г.</a:t>
+              <a:t>16.3.2017 г.</a:t>
             </a:fld>
             <a:endParaRPr lang="bg-BG"/>
           </a:p>
@@ -419,7 +423,7 @@
           <a:p>
             <a:fld id="{1C173AAD-17BE-4B70-87A9-E7BA74A6C5B5}" type="datetimeFigureOut">
               <a:rPr lang="bg-BG" smtClean="0"/>
-              <a:t>8.3.2017 г.</a:t>
+              <a:t>16.3.2017 г.</a:t>
             </a:fld>
             <a:endParaRPr lang="bg-BG"/>
           </a:p>
@@ -599,7 +603,7 @@
           <a:p>
             <a:fld id="{1C173AAD-17BE-4B70-87A9-E7BA74A6C5B5}" type="datetimeFigureOut">
               <a:rPr lang="bg-BG" smtClean="0"/>
-              <a:t>8.3.2017 г.</a:t>
+              <a:t>16.3.2017 г.</a:t>
             </a:fld>
             <a:endParaRPr lang="bg-BG"/>
           </a:p>
@@ -769,7 +773,7 @@
           <a:p>
             <a:fld id="{1C173AAD-17BE-4B70-87A9-E7BA74A6C5B5}" type="datetimeFigureOut">
               <a:rPr lang="bg-BG" smtClean="0"/>
-              <a:t>8.3.2017 г.</a:t>
+              <a:t>16.3.2017 г.</a:t>
             </a:fld>
             <a:endParaRPr lang="bg-BG"/>
           </a:p>
@@ -1015,7 +1019,7 @@
           <a:p>
             <a:fld id="{1C173AAD-17BE-4B70-87A9-E7BA74A6C5B5}" type="datetimeFigureOut">
               <a:rPr lang="bg-BG" smtClean="0"/>
-              <a:t>8.3.2017 г.</a:t>
+              <a:t>16.3.2017 г.</a:t>
             </a:fld>
             <a:endParaRPr lang="bg-BG"/>
           </a:p>
@@ -1247,7 +1251,7 @@
           <a:p>
             <a:fld id="{1C173AAD-17BE-4B70-87A9-E7BA74A6C5B5}" type="datetimeFigureOut">
               <a:rPr lang="bg-BG" smtClean="0"/>
-              <a:t>8.3.2017 г.</a:t>
+              <a:t>16.3.2017 г.</a:t>
             </a:fld>
             <a:endParaRPr lang="bg-BG"/>
           </a:p>
@@ -1614,7 +1618,7 @@
           <a:p>
             <a:fld id="{1C173AAD-17BE-4B70-87A9-E7BA74A6C5B5}" type="datetimeFigureOut">
               <a:rPr lang="bg-BG" smtClean="0"/>
-              <a:t>8.3.2017 г.</a:t>
+              <a:t>16.3.2017 г.</a:t>
             </a:fld>
             <a:endParaRPr lang="bg-BG"/>
           </a:p>
@@ -1732,7 +1736,7 @@
           <a:p>
             <a:fld id="{1C173AAD-17BE-4B70-87A9-E7BA74A6C5B5}" type="datetimeFigureOut">
               <a:rPr lang="bg-BG" smtClean="0"/>
-              <a:t>8.3.2017 г.</a:t>
+              <a:t>16.3.2017 г.</a:t>
             </a:fld>
             <a:endParaRPr lang="bg-BG"/>
           </a:p>
@@ -1827,7 +1831,7 @@
           <a:p>
             <a:fld id="{1C173AAD-17BE-4B70-87A9-E7BA74A6C5B5}" type="datetimeFigureOut">
               <a:rPr lang="bg-BG" smtClean="0"/>
-              <a:t>8.3.2017 г.</a:t>
+              <a:t>16.3.2017 г.</a:t>
             </a:fld>
             <a:endParaRPr lang="bg-BG"/>
           </a:p>
@@ -2104,7 +2108,7 @@
           <a:p>
             <a:fld id="{1C173AAD-17BE-4B70-87A9-E7BA74A6C5B5}" type="datetimeFigureOut">
               <a:rPr lang="bg-BG" smtClean="0"/>
-              <a:t>8.3.2017 г.</a:t>
+              <a:t>16.3.2017 г.</a:t>
             </a:fld>
             <a:endParaRPr lang="bg-BG"/>
           </a:p>
@@ -2357,7 +2361,7 @@
           <a:p>
             <a:fld id="{1C173AAD-17BE-4B70-87A9-E7BA74A6C5B5}" type="datetimeFigureOut">
               <a:rPr lang="bg-BG" smtClean="0"/>
-              <a:t>8.3.2017 г.</a:t>
+              <a:t>16.3.2017 г.</a:t>
             </a:fld>
             <a:endParaRPr lang="bg-BG"/>
           </a:p>
@@ -2570,7 +2574,7 @@
           <a:p>
             <a:fld id="{1C173AAD-17BE-4B70-87A9-E7BA74A6C5B5}" type="datetimeFigureOut">
               <a:rPr lang="bg-BG" smtClean="0"/>
-              <a:t>8.3.2017 г.</a:t>
+              <a:t>16.3.2017 г.</a:t>
             </a:fld>
             <a:endParaRPr lang="bg-BG"/>
           </a:p>
@@ -3530,6 +3534,427 @@
 </p:sld>
 </file>
 
+<file path=ppt/slides/slide10.xml><?xml version="1.0" encoding="utf-8"?>
+<p:sld xmlns:a="http://schemas.openxmlformats.org/drawingml/2006/main" xmlns:r="http://schemas.openxmlformats.org/officeDocument/2006/relationships" xmlns:p="http://schemas.openxmlformats.org/presentationml/2006/main">
+  <p:cSld>
+    <p:spTree>
+      <p:nvGrpSpPr>
+        <p:cNvPr id="1" name=""/>
+        <p:cNvGrpSpPr/>
+        <p:nvPr/>
+      </p:nvGrpSpPr>
+      <p:grpSpPr>
+        <a:xfrm>
+          <a:off x="0" y="0"/>
+          <a:ext cx="0" cy="0"/>
+          <a:chOff x="0" y="0"/>
+          <a:chExt cx="0" cy="0"/>
+        </a:xfrm>
+      </p:grpSpPr>
+      <p:pic>
+        <p:nvPicPr>
+          <p:cNvPr id="2" name="Picture 1"/>
+          <p:cNvPicPr>
+            <a:picLocks noChangeAspect="1"/>
+          </p:cNvPicPr>
+          <p:nvPr/>
+        </p:nvPicPr>
+        <p:blipFill>
+          <a:blip r:embed="rId2"/>
+          <a:stretch>
+            <a:fillRect/>
+          </a:stretch>
+        </p:blipFill>
+        <p:spPr>
+          <a:xfrm>
+            <a:off x="2338387" y="1196975"/>
+            <a:ext cx="5381625" cy="4057650"/>
+          </a:xfrm>
+          <a:prstGeom prst="rect">
+            <a:avLst/>
+          </a:prstGeom>
+        </p:spPr>
+      </p:pic>
+      <p:sp>
+        <p:nvSpPr>
+          <p:cNvPr id="3" name="AutoShape 5"/>
+          <p:cNvSpPr>
+            <a:spLocks noChangeArrowheads="1"/>
+          </p:cNvSpPr>
+          <p:nvPr/>
+        </p:nvSpPr>
+        <p:spPr bwMode="auto">
+          <a:xfrm>
+            <a:off x="5308601" y="2679699"/>
+            <a:ext cx="2565400" cy="758825"/>
+          </a:xfrm>
+          <a:prstGeom prst="wedgeRoundRectCallout">
+            <a:avLst>
+              <a:gd name="adj1" fmla="val -31783"/>
+              <a:gd name="adj2" fmla="val 13731"/>
+              <a:gd name="adj3" fmla="val 16667"/>
+            </a:avLst>
+          </a:prstGeom>
+          <a:solidFill>
+            <a:schemeClr val="bg1">
+              <a:lumMod val="85000"/>
+              <a:alpha val="94902"/>
+            </a:schemeClr>
+          </a:solidFill>
+          <a:ln w="19050">
+            <a:solidFill>
+              <a:schemeClr val="bg1">
+                <a:lumMod val="50000"/>
+                <a:alpha val="80000"/>
+              </a:schemeClr>
+            </a:solidFill>
+          </a:ln>
+        </p:spPr>
+        <p:style>
+          <a:lnRef idx="2">
+            <a:schemeClr val="accent1">
+              <a:shade val="50000"/>
+            </a:schemeClr>
+          </a:lnRef>
+          <a:fillRef idx="1">
+            <a:schemeClr val="accent1"/>
+          </a:fillRef>
+          <a:effectRef idx="0">
+            <a:schemeClr val="accent1"/>
+          </a:effectRef>
+          <a:fontRef idx="minor">
+            <a:schemeClr val="lt1"/>
+          </a:fontRef>
+        </p:style>
+        <p:txBody>
+          <a:bodyPr rot="0" spcFirstLastPara="0" vertOverflow="overflow" horzOverflow="overflow" vert="horz" wrap="square" lIns="91440" tIns="45720" rIns="91440" bIns="45720" numCol="1" spcCol="0" rtlCol="0" fromWordArt="0" anchor="ctr" anchorCtr="0" forceAA="0" compatLnSpc="1">
+            <a:prstTxWarp prst="textNoShape">
+              <a:avLst/>
+            </a:prstTxWarp>
+            <a:noAutofit/>
+          </a:bodyPr>
+          <a:lstStyle/>
+          <a:p>
+            <a:pPr algn="ctr"/>
+            <a:r>
+              <a:rPr lang="bg-BG" sz="2800" b="1" dirty="0" smtClean="0">
+                <a:solidFill>
+                  <a:schemeClr val="tx1"/>
+                </a:solidFill>
+                <a:effectLst>
+                  <a:outerShdw blurRad="38100" dist="38100" dir="2700000" algn="tl">
+                    <a:schemeClr val="bg1">
+                      <a:alpha val="43000"/>
+                    </a:schemeClr>
+                  </a:outerShdw>
+                </a:effectLst>
+              </a:rPr>
+              <a:t>Междинна част</a:t>
+            </a:r>
+            <a:endParaRPr lang="bg-BG" sz="2800" b="1" dirty="0">
+              <a:solidFill>
+                <a:schemeClr val="tx1"/>
+              </a:solidFill>
+              <a:effectLst>
+                <a:outerShdw blurRad="38100" dist="38100" dir="2700000" algn="tl">
+                  <a:schemeClr val="bg1">
+                    <a:alpha val="43000"/>
+                  </a:schemeClr>
+                </a:outerShdw>
+              </a:effectLst>
+            </a:endParaRPr>
+          </a:p>
+        </p:txBody>
+      </p:sp>
+      <p:sp>
+        <p:nvSpPr>
+          <p:cNvPr id="4" name="AutoShape 5"/>
+          <p:cNvSpPr>
+            <a:spLocks noChangeArrowheads="1"/>
+          </p:cNvSpPr>
+          <p:nvPr/>
+        </p:nvSpPr>
+        <p:spPr bwMode="auto">
+          <a:xfrm>
+            <a:off x="5626101" y="4495800"/>
+            <a:ext cx="2565400" cy="758825"/>
+          </a:xfrm>
+          <a:prstGeom prst="wedgeRoundRectCallout">
+            <a:avLst>
+              <a:gd name="adj1" fmla="val -78813"/>
+              <a:gd name="adj2" fmla="val 28794"/>
+              <a:gd name="adj3" fmla="val 16667"/>
+            </a:avLst>
+          </a:prstGeom>
+          <a:solidFill>
+            <a:schemeClr val="bg1">
+              <a:lumMod val="85000"/>
+              <a:alpha val="94902"/>
+            </a:schemeClr>
+          </a:solidFill>
+          <a:ln w="19050">
+            <a:solidFill>
+              <a:schemeClr val="bg1">
+                <a:lumMod val="50000"/>
+                <a:alpha val="80000"/>
+              </a:schemeClr>
+            </a:solidFill>
+          </a:ln>
+        </p:spPr>
+        <p:style>
+          <a:lnRef idx="2">
+            <a:schemeClr val="accent1">
+              <a:shade val="50000"/>
+            </a:schemeClr>
+          </a:lnRef>
+          <a:fillRef idx="1">
+            <a:schemeClr val="accent1"/>
+          </a:fillRef>
+          <a:effectRef idx="0">
+            <a:schemeClr val="accent1"/>
+          </a:effectRef>
+          <a:fontRef idx="minor">
+            <a:schemeClr val="lt1"/>
+          </a:fontRef>
+        </p:style>
+        <p:txBody>
+          <a:bodyPr rot="0" spcFirstLastPara="0" vertOverflow="overflow" horzOverflow="overflow" vert="horz" wrap="square" lIns="91440" tIns="45720" rIns="91440" bIns="45720" numCol="1" spcCol="0" rtlCol="0" fromWordArt="0" anchor="ctr" anchorCtr="0" forceAA="0" compatLnSpc="1">
+            <a:prstTxWarp prst="textNoShape">
+              <a:avLst/>
+            </a:prstTxWarp>
+            <a:noAutofit/>
+          </a:bodyPr>
+          <a:lstStyle/>
+          <a:p>
+            <a:pPr algn="ctr"/>
+            <a:r>
+              <a:rPr lang="bg-BG" sz="2800" b="1" dirty="0" smtClean="0">
+                <a:solidFill>
+                  <a:schemeClr val="tx1"/>
+                </a:solidFill>
+                <a:effectLst>
+                  <a:outerShdw blurRad="38100" dist="38100" dir="2700000" algn="tl">
+                    <a:schemeClr val="bg1">
+                      <a:alpha val="43000"/>
+                    </a:schemeClr>
+                  </a:outerShdw>
+                </a:effectLst>
+              </a:rPr>
+              <a:t>Минаване на нов ред</a:t>
+            </a:r>
+            <a:endParaRPr lang="bg-BG" sz="2800" b="1" dirty="0">
+              <a:solidFill>
+                <a:schemeClr val="tx1"/>
+              </a:solidFill>
+              <a:effectLst>
+                <a:outerShdw blurRad="38100" dist="38100" dir="2700000" algn="tl">
+                  <a:schemeClr val="bg1">
+                    <a:alpha val="43000"/>
+                  </a:schemeClr>
+                </a:outerShdw>
+              </a:effectLst>
+            </a:endParaRPr>
+          </a:p>
+        </p:txBody>
+      </p:sp>
+    </p:spTree>
+    <p:extLst>
+      <p:ext uri="{BB962C8B-B14F-4D97-AF65-F5344CB8AC3E}">
+        <p14:creationId xmlns:p14="http://schemas.microsoft.com/office/powerpoint/2010/main" val="928520597"/>
+      </p:ext>
+    </p:extLst>
+  </p:cSld>
+  <p:clrMapOvr>
+    <a:masterClrMapping/>
+  </p:clrMapOvr>
+  <p:timing>
+    <p:tnLst>
+      <p:par>
+        <p:cTn id="1" dur="indefinite" restart="never" nodeType="tmRoot">
+          <p:childTnLst>
+            <p:seq concurrent="1" nextAc="seek">
+              <p:cTn id="2" dur="indefinite" nodeType="mainSeq">
+                <p:childTnLst>
+                  <p:par>
+                    <p:cTn id="3" fill="hold">
+                      <p:stCondLst>
+                        <p:cond delay="indefinite"/>
+                      </p:stCondLst>
+                      <p:childTnLst>
+                        <p:par>
+                          <p:cTn id="4" fill="hold">
+                            <p:stCondLst>
+                              <p:cond delay="0"/>
+                            </p:stCondLst>
+                            <p:childTnLst>
+                              <p:par>
+                                <p:cTn id="5" presetID="1" presetClass="entr" presetSubtype="0" fill="hold" grpId="0" nodeType="clickEffect">
+                                  <p:stCondLst>
+                                    <p:cond delay="0"/>
+                                  </p:stCondLst>
+                                  <p:childTnLst>
+                                    <p:set>
+                                      <p:cBhvr>
+                                        <p:cTn id="6" dur="1" fill="hold">
+                                          <p:stCondLst>
+                                            <p:cond delay="0"/>
+                                          </p:stCondLst>
+                                        </p:cTn>
+                                        <p:tgtEl>
+                                          <p:spTgt spid="3"/>
+                                        </p:tgtEl>
+                                        <p:attrNameLst>
+                                          <p:attrName>style.visibility</p:attrName>
+                                        </p:attrNameLst>
+                                      </p:cBhvr>
+                                      <p:to>
+                                        <p:strVal val="visible"/>
+                                      </p:to>
+                                    </p:set>
+                                  </p:childTnLst>
+                                </p:cTn>
+                              </p:par>
+                            </p:childTnLst>
+                          </p:cTn>
+                        </p:par>
+                      </p:childTnLst>
+                    </p:cTn>
+                  </p:par>
+                  <p:par>
+                    <p:cTn id="7" fill="hold">
+                      <p:stCondLst>
+                        <p:cond delay="indefinite"/>
+                      </p:stCondLst>
+                      <p:childTnLst>
+                        <p:par>
+                          <p:cTn id="8" fill="hold">
+                            <p:stCondLst>
+                              <p:cond delay="0"/>
+                            </p:stCondLst>
+                            <p:childTnLst>
+                              <p:par>
+                                <p:cTn id="9" presetID="1" presetClass="entr" presetSubtype="0" fill="hold" grpId="0" nodeType="clickEffect">
+                                  <p:stCondLst>
+                                    <p:cond delay="0"/>
+                                  </p:stCondLst>
+                                  <p:childTnLst>
+                                    <p:set>
+                                      <p:cBhvr>
+                                        <p:cTn id="10" dur="1" fill="hold">
+                                          <p:stCondLst>
+                                            <p:cond delay="0"/>
+                                          </p:stCondLst>
+                                        </p:cTn>
+                                        <p:tgtEl>
+                                          <p:spTgt spid="4"/>
+                                        </p:tgtEl>
+                                        <p:attrNameLst>
+                                          <p:attrName>style.visibility</p:attrName>
+                                        </p:attrNameLst>
+                                      </p:cBhvr>
+                                      <p:to>
+                                        <p:strVal val="visible"/>
+                                      </p:to>
+                                    </p:set>
+                                  </p:childTnLst>
+                                </p:cTn>
+                              </p:par>
+                            </p:childTnLst>
+                          </p:cTn>
+                        </p:par>
+                      </p:childTnLst>
+                    </p:cTn>
+                  </p:par>
+                </p:childTnLst>
+              </p:cTn>
+              <p:prevCondLst>
+                <p:cond evt="onPrev" delay="0">
+                  <p:tgtEl>
+                    <p:sldTgt/>
+                  </p:tgtEl>
+                </p:cond>
+              </p:prevCondLst>
+              <p:nextCondLst>
+                <p:cond evt="onNext" delay="0">
+                  <p:tgtEl>
+                    <p:sldTgt/>
+                  </p:tgtEl>
+                </p:cond>
+              </p:nextCondLst>
+            </p:seq>
+          </p:childTnLst>
+        </p:cTn>
+      </p:par>
+    </p:tnLst>
+    <p:bldLst>
+      <p:bldP spid="3" grpId="0" animBg="1"/>
+      <p:bldP spid="4" grpId="0" animBg="1"/>
+    </p:bldLst>
+  </p:timing>
+</p:sld>
+</file>
+
+<file path=ppt/slides/slide11.xml><?xml version="1.0" encoding="utf-8"?>
+<p:sld xmlns:a="http://schemas.openxmlformats.org/drawingml/2006/main" xmlns:r="http://schemas.openxmlformats.org/officeDocument/2006/relationships" xmlns:p="http://schemas.openxmlformats.org/presentationml/2006/main">
+  <p:cSld>
+    <p:spTree>
+      <p:nvGrpSpPr>
+        <p:cNvPr id="1" name=""/>
+        <p:cNvGrpSpPr/>
+        <p:nvPr/>
+      </p:nvGrpSpPr>
+      <p:grpSpPr>
+        <a:xfrm>
+          <a:off x="0" y="0"/>
+          <a:ext cx="0" cy="0"/>
+          <a:chOff x="0" y="0"/>
+          <a:chExt cx="0" cy="0"/>
+        </a:xfrm>
+      </p:grpSpPr>
+      <p:pic>
+        <p:nvPicPr>
+          <p:cNvPr id="2" name="Picture 1"/>
+          <p:cNvPicPr>
+            <a:picLocks noChangeAspect="1"/>
+          </p:cNvPicPr>
+          <p:nvPr/>
+        </p:nvPicPr>
+        <p:blipFill>
+          <a:blip r:embed="rId2"/>
+          <a:stretch>
+            <a:fillRect/>
+          </a:stretch>
+        </p:blipFill>
+        <p:spPr>
+          <a:xfrm>
+            <a:off x="2330450" y="1211262"/>
+            <a:ext cx="5829300" cy="4181475"/>
+          </a:xfrm>
+          <a:prstGeom prst="rect">
+            <a:avLst/>
+          </a:prstGeom>
+        </p:spPr>
+      </p:pic>
+    </p:spTree>
+    <p:extLst>
+      <p:ext uri="{BB962C8B-B14F-4D97-AF65-F5344CB8AC3E}">
+        <p14:creationId xmlns:p14="http://schemas.microsoft.com/office/powerpoint/2010/main" val="85104158"/>
+      </p:ext>
+    </p:extLst>
+  </p:cSld>
+  <p:clrMapOvr>
+    <a:masterClrMapping/>
+  </p:clrMapOvr>
+  <p:timing>
+    <p:tnLst>
+      <p:par>
+        <p:cTn id="1" dur="indefinite" restart="never" nodeType="tmRoot"/>
+      </p:par>
+    </p:tnLst>
+  </p:timing>
+</p:sld>
+</file>
+
 <file path=ppt/slides/slide2.xml><?xml version="1.0" encoding="utf-8"?>
 <p:sld xmlns:a="http://schemas.openxmlformats.org/drawingml/2006/main" xmlns:r="http://schemas.openxmlformats.org/officeDocument/2006/relationships" xmlns:p="http://schemas.openxmlformats.org/presentationml/2006/main">
   <p:cSld>
@@ -6339,6 +6764,452 @@
 </p:sld>
 </file>
 
+<file path=ppt/slides/slide8.xml><?xml version="1.0" encoding="utf-8"?>
+<p:sld xmlns:a="http://schemas.openxmlformats.org/drawingml/2006/main" xmlns:r="http://schemas.openxmlformats.org/officeDocument/2006/relationships" xmlns:p="http://schemas.openxmlformats.org/presentationml/2006/main">
+  <p:cSld>
+    <p:spTree>
+      <p:nvGrpSpPr>
+        <p:cNvPr id="1" name=""/>
+        <p:cNvGrpSpPr/>
+        <p:nvPr/>
+      </p:nvGrpSpPr>
+      <p:grpSpPr>
+        <a:xfrm>
+          <a:off x="0" y="0"/>
+          <a:ext cx="0" cy="0"/>
+          <a:chOff x="0" y="0"/>
+          <a:chExt cx="0" cy="0"/>
+        </a:xfrm>
+      </p:grpSpPr>
+      <p:pic>
+        <p:nvPicPr>
+          <p:cNvPr id="8" name="Picture 7"/>
+          <p:cNvPicPr>
+            <a:picLocks noChangeAspect="1"/>
+          </p:cNvPicPr>
+          <p:nvPr/>
+        </p:nvPicPr>
+        <p:blipFill>
+          <a:blip r:embed="rId2"/>
+          <a:stretch>
+            <a:fillRect/>
+          </a:stretch>
+        </p:blipFill>
+        <p:spPr>
+          <a:xfrm>
+            <a:off x="2008187" y="2122898"/>
+            <a:ext cx="5421313" cy="2288547"/>
+          </a:xfrm>
+          <a:prstGeom prst="rect">
+            <a:avLst/>
+          </a:prstGeom>
+        </p:spPr>
+      </p:pic>
+      <p:sp>
+        <p:nvSpPr>
+          <p:cNvPr id="13" name="AutoShape 5"/>
+          <p:cNvSpPr>
+            <a:spLocks noChangeArrowheads="1"/>
+          </p:cNvSpPr>
+          <p:nvPr/>
+        </p:nvSpPr>
+        <p:spPr bwMode="auto">
+          <a:xfrm>
+            <a:off x="5207000" y="3481798"/>
+            <a:ext cx="3110865" cy="1191802"/>
+          </a:xfrm>
+          <a:prstGeom prst="wedgeRoundRectCallout">
+            <a:avLst>
+              <a:gd name="adj1" fmla="val -64009"/>
+              <a:gd name="adj2" fmla="val 8553"/>
+              <a:gd name="adj3" fmla="val 16667"/>
+            </a:avLst>
+          </a:prstGeom>
+          <a:solidFill>
+            <a:schemeClr val="bg1">
+              <a:lumMod val="85000"/>
+              <a:alpha val="94902"/>
+            </a:schemeClr>
+          </a:solidFill>
+          <a:ln w="19050">
+            <a:solidFill>
+              <a:schemeClr val="bg1">
+                <a:lumMod val="50000"/>
+                <a:alpha val="80000"/>
+              </a:schemeClr>
+            </a:solidFill>
+          </a:ln>
+        </p:spPr>
+        <p:style>
+          <a:lnRef idx="2">
+            <a:schemeClr val="accent1">
+              <a:shade val="50000"/>
+            </a:schemeClr>
+          </a:lnRef>
+          <a:fillRef idx="1">
+            <a:schemeClr val="accent1"/>
+          </a:fillRef>
+          <a:effectRef idx="0">
+            <a:schemeClr val="accent1"/>
+          </a:effectRef>
+          <a:fontRef idx="minor">
+            <a:schemeClr val="lt1"/>
+          </a:fontRef>
+        </p:style>
+        <p:txBody>
+          <a:bodyPr rot="0" spcFirstLastPara="0" vertOverflow="overflow" horzOverflow="overflow" vert="horz" wrap="square" lIns="91440" tIns="45720" rIns="91440" bIns="45720" numCol="1" spcCol="0" rtlCol="0" fromWordArt="0" anchor="ctr" anchorCtr="0" forceAA="0" compatLnSpc="1">
+            <a:prstTxWarp prst="textNoShape">
+              <a:avLst/>
+            </a:prstTxWarp>
+            <a:noAutofit/>
+          </a:bodyPr>
+          <a:lstStyle/>
+          <a:p>
+            <a:pPr algn="ctr"/>
+            <a:r>
+              <a:rPr lang="bg-BG" sz="2800" b="1" dirty="0" smtClean="0">
+                <a:solidFill>
+                  <a:schemeClr val="tx1"/>
+                </a:solidFill>
+                <a:effectLst>
+                  <a:outerShdw blurRad="38100" dist="38100" dir="2700000" algn="tl">
+                    <a:schemeClr val="bg1">
+                      <a:alpha val="43000"/>
+                    </a:schemeClr>
+                  </a:outerShdw>
+                </a:effectLst>
+              </a:rPr>
+              <a:t>Печатане на специални символи</a:t>
+            </a:r>
+            <a:endParaRPr lang="bg-BG" sz="2800" b="1" dirty="0">
+              <a:solidFill>
+                <a:schemeClr val="tx1"/>
+              </a:solidFill>
+              <a:effectLst>
+                <a:outerShdw blurRad="38100" dist="38100" dir="2700000" algn="tl">
+                  <a:schemeClr val="bg1">
+                    <a:alpha val="43000"/>
+                  </a:schemeClr>
+                </a:outerShdw>
+              </a:effectLst>
+            </a:endParaRPr>
+          </a:p>
+        </p:txBody>
+      </p:sp>
+    </p:spTree>
+    <p:extLst>
+      <p:ext uri="{BB962C8B-B14F-4D97-AF65-F5344CB8AC3E}">
+        <p14:creationId xmlns:p14="http://schemas.microsoft.com/office/powerpoint/2010/main" val="2787840989"/>
+      </p:ext>
+    </p:extLst>
+  </p:cSld>
+  <p:clrMapOvr>
+    <a:masterClrMapping/>
+  </p:clrMapOvr>
+  <p:timing>
+    <p:tnLst>
+      <p:par>
+        <p:cTn id="1" dur="indefinite" restart="never" nodeType="tmRoot">
+          <p:childTnLst>
+            <p:seq concurrent="1" nextAc="seek">
+              <p:cTn id="2" dur="indefinite" nodeType="mainSeq">
+                <p:childTnLst>
+                  <p:par>
+                    <p:cTn id="3" fill="hold">
+                      <p:stCondLst>
+                        <p:cond delay="indefinite"/>
+                      </p:stCondLst>
+                      <p:childTnLst>
+                        <p:par>
+                          <p:cTn id="4" fill="hold">
+                            <p:stCondLst>
+                              <p:cond delay="0"/>
+                            </p:stCondLst>
+                            <p:childTnLst>
+                              <p:par>
+                                <p:cTn id="5" presetID="1" presetClass="entr" presetSubtype="0" fill="hold" grpId="0" nodeType="clickEffect">
+                                  <p:stCondLst>
+                                    <p:cond delay="0"/>
+                                  </p:stCondLst>
+                                  <p:childTnLst>
+                                    <p:set>
+                                      <p:cBhvr>
+                                        <p:cTn id="6" dur="1" fill="hold">
+                                          <p:stCondLst>
+                                            <p:cond delay="0"/>
+                                          </p:stCondLst>
+                                        </p:cTn>
+                                        <p:tgtEl>
+                                          <p:spTgt spid="13"/>
+                                        </p:tgtEl>
+                                        <p:attrNameLst>
+                                          <p:attrName>style.visibility</p:attrName>
+                                        </p:attrNameLst>
+                                      </p:cBhvr>
+                                      <p:to>
+                                        <p:strVal val="visible"/>
+                                      </p:to>
+                                    </p:set>
+                                  </p:childTnLst>
+                                </p:cTn>
+                              </p:par>
+                            </p:childTnLst>
+                          </p:cTn>
+                        </p:par>
+                      </p:childTnLst>
+                    </p:cTn>
+                  </p:par>
+                </p:childTnLst>
+              </p:cTn>
+              <p:prevCondLst>
+                <p:cond evt="onPrev" delay="0">
+                  <p:tgtEl>
+                    <p:sldTgt/>
+                  </p:tgtEl>
+                </p:cond>
+              </p:prevCondLst>
+              <p:nextCondLst>
+                <p:cond evt="onNext" delay="0">
+                  <p:tgtEl>
+                    <p:sldTgt/>
+                  </p:tgtEl>
+                </p:cond>
+              </p:nextCondLst>
+            </p:seq>
+          </p:childTnLst>
+        </p:cTn>
+      </p:par>
+    </p:tnLst>
+    <p:bldLst>
+      <p:bldP spid="13" grpId="0" animBg="1"/>
+    </p:bldLst>
+  </p:timing>
+</p:sld>
+</file>
+
+<file path=ppt/slides/slide9.xml><?xml version="1.0" encoding="utf-8"?>
+<p:sld xmlns:a="http://schemas.openxmlformats.org/drawingml/2006/main" xmlns:r="http://schemas.openxmlformats.org/officeDocument/2006/relationships" xmlns:p="http://schemas.openxmlformats.org/presentationml/2006/main">
+  <p:cSld>
+    <p:spTree>
+      <p:nvGrpSpPr>
+        <p:cNvPr id="1" name=""/>
+        <p:cNvGrpSpPr/>
+        <p:nvPr/>
+      </p:nvGrpSpPr>
+      <p:grpSpPr>
+        <a:xfrm>
+          <a:off x="0" y="0"/>
+          <a:ext cx="0" cy="0"/>
+          <a:chOff x="0" y="0"/>
+          <a:chExt cx="0" cy="0"/>
+        </a:xfrm>
+      </p:grpSpPr>
+      <p:pic>
+        <p:nvPicPr>
+          <p:cNvPr id="2" name="Picture 1"/>
+          <p:cNvPicPr>
+            <a:picLocks noChangeAspect="1"/>
+          </p:cNvPicPr>
+          <p:nvPr/>
+        </p:nvPicPr>
+        <p:blipFill>
+          <a:blip r:embed="rId2"/>
+          <a:stretch>
+            <a:fillRect/>
+          </a:stretch>
+        </p:blipFill>
+        <p:spPr>
+          <a:xfrm>
+            <a:off x="3514725" y="2289175"/>
+            <a:ext cx="4476750" cy="1238250"/>
+          </a:xfrm>
+          <a:prstGeom prst="rect">
+            <a:avLst/>
+          </a:prstGeom>
+        </p:spPr>
+      </p:pic>
+      <p:sp>
+        <p:nvSpPr>
+          <p:cNvPr id="3" name="AutoShape 5"/>
+          <p:cNvSpPr>
+            <a:spLocks noChangeArrowheads="1"/>
+          </p:cNvSpPr>
+          <p:nvPr/>
+        </p:nvSpPr>
+        <p:spPr bwMode="auto">
+          <a:xfrm>
+            <a:off x="7861301" y="2335623"/>
+            <a:ext cx="2565400" cy="1191802"/>
+          </a:xfrm>
+          <a:prstGeom prst="wedgeRoundRectCallout">
+            <a:avLst>
+              <a:gd name="adj1" fmla="val -92178"/>
+              <a:gd name="adj2" fmla="val 11750"/>
+              <a:gd name="adj3" fmla="val 16667"/>
+            </a:avLst>
+          </a:prstGeom>
+          <a:solidFill>
+            <a:schemeClr val="bg1">
+              <a:lumMod val="85000"/>
+              <a:alpha val="94902"/>
+            </a:schemeClr>
+          </a:solidFill>
+          <a:ln w="19050">
+            <a:solidFill>
+              <a:schemeClr val="bg1">
+                <a:lumMod val="50000"/>
+                <a:alpha val="80000"/>
+              </a:schemeClr>
+            </a:solidFill>
+          </a:ln>
+        </p:spPr>
+        <p:style>
+          <a:lnRef idx="2">
+            <a:schemeClr val="accent1">
+              <a:shade val="50000"/>
+            </a:schemeClr>
+          </a:lnRef>
+          <a:fillRef idx="1">
+            <a:schemeClr val="accent1"/>
+          </a:fillRef>
+          <a:effectRef idx="0">
+            <a:schemeClr val="accent1"/>
+          </a:effectRef>
+          <a:fontRef idx="minor">
+            <a:schemeClr val="lt1"/>
+          </a:fontRef>
+        </p:style>
+        <p:txBody>
+          <a:bodyPr rot="0" spcFirstLastPara="0" vertOverflow="overflow" horzOverflow="overflow" vert="horz" wrap="square" lIns="91440" tIns="45720" rIns="91440" bIns="45720" numCol="1" spcCol="0" rtlCol="0" fromWordArt="0" anchor="ctr" anchorCtr="0" forceAA="0" compatLnSpc="1">
+            <a:prstTxWarp prst="textNoShape">
+              <a:avLst/>
+            </a:prstTxWarp>
+            <a:noAutofit/>
+          </a:bodyPr>
+          <a:lstStyle/>
+          <a:p>
+            <a:pPr algn="ctr"/>
+            <a:r>
+              <a:rPr lang="bg-BG" sz="2800" b="1" dirty="0" smtClean="0">
+                <a:solidFill>
+                  <a:schemeClr val="tx1"/>
+                </a:solidFill>
+                <a:effectLst>
+                  <a:outerShdw blurRad="38100" dist="38100" dir="2700000" algn="tl">
+                    <a:schemeClr val="bg1">
+                      <a:alpha val="43000"/>
+                    </a:schemeClr>
+                  </a:outerShdw>
+                </a:effectLst>
+              </a:rPr>
+              <a:t>Минаване на нов ред</a:t>
+            </a:r>
+            <a:endParaRPr lang="bg-BG" sz="2800" b="1" dirty="0">
+              <a:solidFill>
+                <a:schemeClr val="tx1"/>
+              </a:solidFill>
+              <a:effectLst>
+                <a:outerShdw blurRad="38100" dist="38100" dir="2700000" algn="tl">
+                  <a:schemeClr val="bg1">
+                    <a:alpha val="43000"/>
+                  </a:schemeClr>
+                </a:outerShdw>
+              </a:effectLst>
+            </a:endParaRPr>
+          </a:p>
+        </p:txBody>
+      </p:sp>
+    </p:spTree>
+    <p:extLst>
+      <p:ext uri="{BB962C8B-B14F-4D97-AF65-F5344CB8AC3E}">
+        <p14:creationId xmlns:p14="http://schemas.microsoft.com/office/powerpoint/2010/main" val="2442517872"/>
+      </p:ext>
+    </p:extLst>
+  </p:cSld>
+  <p:clrMapOvr>
+    <a:masterClrMapping/>
+  </p:clrMapOvr>
+  <p:timing>
+    <p:tnLst>
+      <p:par>
+        <p:cTn id="1" dur="indefinite" restart="never" nodeType="tmRoot">
+          <p:childTnLst>
+            <p:seq concurrent="1" nextAc="seek">
+              <p:cTn id="2" dur="indefinite" nodeType="mainSeq">
+                <p:childTnLst>
+                  <p:par>
+                    <p:cTn id="3" fill="hold">
+                      <p:stCondLst>
+                        <p:cond delay="indefinite"/>
+                      </p:stCondLst>
+                      <p:childTnLst>
+                        <p:par>
+                          <p:cTn id="4" fill="hold">
+                            <p:stCondLst>
+                              <p:cond delay="0"/>
+                            </p:stCondLst>
+                            <p:childTnLst>
+                              <p:par>
+                                <p:cTn id="5" presetID="1" presetClass="entr" presetSubtype="0" fill="hold" grpId="0" nodeType="clickEffect">
+                                  <p:stCondLst>
+                                    <p:cond delay="0"/>
+                                  </p:stCondLst>
+                                  <p:childTnLst>
+                                    <p:set>
+                                      <p:cBhvr>
+                                        <p:cTn id="6" dur="1" fill="hold">
+                                          <p:stCondLst>
+                                            <p:cond delay="0"/>
+                                          </p:stCondLst>
+                                        </p:cTn>
+                                        <p:tgtEl>
+                                          <p:spTgt spid="3"/>
+                                        </p:tgtEl>
+                                        <p:attrNameLst>
+                                          <p:attrName>style.visibility</p:attrName>
+                                        </p:attrNameLst>
+                                      </p:cBhvr>
+                                      <p:to>
+                                        <p:strVal val="visible"/>
+                                      </p:to>
+                                    </p:set>
+                                  </p:childTnLst>
+                                </p:cTn>
+                              </p:par>
+                            </p:childTnLst>
+                          </p:cTn>
+                        </p:par>
+                      </p:childTnLst>
+                    </p:cTn>
+                  </p:par>
+                </p:childTnLst>
+              </p:cTn>
+              <p:prevCondLst>
+                <p:cond evt="onPrev" delay="0">
+                  <p:tgtEl>
+                    <p:sldTgt/>
+                  </p:tgtEl>
+                </p:cond>
+              </p:prevCondLst>
+              <p:nextCondLst>
+                <p:cond evt="onNext" delay="0">
+                  <p:tgtEl>
+                    <p:sldTgt/>
+                  </p:tgtEl>
+                </p:cond>
+              </p:nextCondLst>
+            </p:seq>
+          </p:childTnLst>
+        </p:cTn>
+      </p:par>
+    </p:tnLst>
+    <p:bldLst>
+      <p:bldP spid="3" grpId="0" animBg="1"/>
+    </p:bldLst>
+  </p:timing>
+</p:sld>
+</file>
+
 <file path=ppt/theme/theme1.xml><?xml version="1.0" encoding="utf-8"?>
 <a:theme xmlns:a="http://schemas.openxmlformats.org/drawingml/2006/main" name="Office Theme">
   <a:themeElements>

</xml_diff>